<commit_message>
ajustes e tradução inicial
</commit_message>
<xml_diff>
--- a/charts/charts.pptx
+++ b/charts/charts.pptx
@@ -216,7 +216,7 @@
           <a:p>
             <a:fld id="{511DBF38-111F-4C48-93F4-B65DF8B44846}" type="datetimeFigureOut">
               <a:rPr lang="en-US" smtClean="0"/>
-              <a:t>7/6/20</a:t>
+              <a:t>3/6/2023</a:t>
             </a:fld>
             <a:endParaRPr lang="en-US"/>
           </a:p>
@@ -374,7 +374,7 @@
           <a:p>
             <a:fld id="{45F4A47B-6ABA-7A43-9B62-E238D0091B16}" type="slidenum">
               <a:rPr lang="en-US" smtClean="0"/>
-              <a:t>‹#›</a:t>
+              <a:t>‹nº›</a:t>
             </a:fld>
             <a:endParaRPr lang="en-US"/>
           </a:p>
@@ -612,7 +612,7 @@
           <a:p>
             <a:fld id="{37B1D8A3-40A5-CC46-B346-36758DE6AE04}" type="datetimeFigureOut">
               <a:rPr lang="en-US" smtClean="0"/>
-              <a:t>7/6/20</a:t>
+              <a:t>3/6/2023</a:t>
             </a:fld>
             <a:endParaRPr lang="en-US"/>
           </a:p>
@@ -654,7 +654,7 @@
           <a:p>
             <a:fld id="{1DAA5291-BD98-6C47-AA17-C1290F31D66D}" type="slidenum">
               <a:rPr lang="en-US" smtClean="0"/>
-              <a:t>‹#›</a:t>
+              <a:t>‹nº›</a:t>
             </a:fld>
             <a:endParaRPr lang="en-US"/>
           </a:p>
@@ -780,7 +780,7 @@
           <a:p>
             <a:fld id="{37B1D8A3-40A5-CC46-B346-36758DE6AE04}" type="datetimeFigureOut">
               <a:rPr lang="en-US" smtClean="0"/>
-              <a:t>7/6/20</a:t>
+              <a:t>3/6/2023</a:t>
             </a:fld>
             <a:endParaRPr lang="en-US"/>
           </a:p>
@@ -822,7 +822,7 @@
           <a:p>
             <a:fld id="{1DAA5291-BD98-6C47-AA17-C1290F31D66D}" type="slidenum">
               <a:rPr lang="en-US" smtClean="0"/>
-              <a:t>‹#›</a:t>
+              <a:t>‹nº›</a:t>
             </a:fld>
             <a:endParaRPr lang="en-US"/>
           </a:p>
@@ -958,7 +958,7 @@
           <a:p>
             <a:fld id="{37B1D8A3-40A5-CC46-B346-36758DE6AE04}" type="datetimeFigureOut">
               <a:rPr lang="en-US" smtClean="0"/>
-              <a:t>7/6/20</a:t>
+              <a:t>3/6/2023</a:t>
             </a:fld>
             <a:endParaRPr lang="en-US"/>
           </a:p>
@@ -1000,7 +1000,7 @@
           <a:p>
             <a:fld id="{1DAA5291-BD98-6C47-AA17-C1290F31D66D}" type="slidenum">
               <a:rPr lang="en-US" smtClean="0"/>
-              <a:t>‹#›</a:t>
+              <a:t>‹nº›</a:t>
             </a:fld>
             <a:endParaRPr lang="en-US"/>
           </a:p>
@@ -1126,7 +1126,7 @@
           <a:p>
             <a:fld id="{37B1D8A3-40A5-CC46-B346-36758DE6AE04}" type="datetimeFigureOut">
               <a:rPr lang="en-US" smtClean="0"/>
-              <a:t>7/6/20</a:t>
+              <a:t>3/6/2023</a:t>
             </a:fld>
             <a:endParaRPr lang="en-US"/>
           </a:p>
@@ -1168,7 +1168,7 @@
           <a:p>
             <a:fld id="{1DAA5291-BD98-6C47-AA17-C1290F31D66D}" type="slidenum">
               <a:rPr lang="en-US" smtClean="0"/>
-              <a:t>‹#›</a:t>
+              <a:t>‹nº›</a:t>
             </a:fld>
             <a:endParaRPr lang="en-US"/>
           </a:p>
@@ -1371,7 +1371,7 @@
           <a:p>
             <a:fld id="{37B1D8A3-40A5-CC46-B346-36758DE6AE04}" type="datetimeFigureOut">
               <a:rPr lang="en-US" smtClean="0"/>
-              <a:t>7/6/20</a:t>
+              <a:t>3/6/2023</a:t>
             </a:fld>
             <a:endParaRPr lang="en-US"/>
           </a:p>
@@ -1413,7 +1413,7 @@
           <a:p>
             <a:fld id="{1DAA5291-BD98-6C47-AA17-C1290F31D66D}" type="slidenum">
               <a:rPr lang="en-US" smtClean="0"/>
-              <a:t>‹#›</a:t>
+              <a:t>‹nº›</a:t>
             </a:fld>
             <a:endParaRPr lang="en-US"/>
           </a:p>
@@ -1600,7 +1600,7 @@
           <a:p>
             <a:fld id="{37B1D8A3-40A5-CC46-B346-36758DE6AE04}" type="datetimeFigureOut">
               <a:rPr lang="en-US" smtClean="0"/>
-              <a:t>7/6/20</a:t>
+              <a:t>3/6/2023</a:t>
             </a:fld>
             <a:endParaRPr lang="en-US"/>
           </a:p>
@@ -1642,7 +1642,7 @@
           <a:p>
             <a:fld id="{1DAA5291-BD98-6C47-AA17-C1290F31D66D}" type="slidenum">
               <a:rPr lang="en-US" smtClean="0"/>
-              <a:t>‹#›</a:t>
+              <a:t>‹nº›</a:t>
             </a:fld>
             <a:endParaRPr lang="en-US"/>
           </a:p>
@@ -1964,7 +1964,7 @@
           <a:p>
             <a:fld id="{37B1D8A3-40A5-CC46-B346-36758DE6AE04}" type="datetimeFigureOut">
               <a:rPr lang="en-US" smtClean="0"/>
-              <a:t>7/6/20</a:t>
+              <a:t>3/6/2023</a:t>
             </a:fld>
             <a:endParaRPr lang="en-US"/>
           </a:p>
@@ -2006,7 +2006,7 @@
           <a:p>
             <a:fld id="{1DAA5291-BD98-6C47-AA17-C1290F31D66D}" type="slidenum">
               <a:rPr lang="en-US" smtClean="0"/>
-              <a:t>‹#›</a:t>
+              <a:t>‹nº›</a:t>
             </a:fld>
             <a:endParaRPr lang="en-US"/>
           </a:p>
@@ -2081,7 +2081,7 @@
           <a:p>
             <a:fld id="{37B1D8A3-40A5-CC46-B346-36758DE6AE04}" type="datetimeFigureOut">
               <a:rPr lang="en-US" smtClean="0"/>
-              <a:t>7/6/20</a:t>
+              <a:t>3/6/2023</a:t>
             </a:fld>
             <a:endParaRPr lang="en-US"/>
           </a:p>
@@ -2123,7 +2123,7 @@
           <a:p>
             <a:fld id="{1DAA5291-BD98-6C47-AA17-C1290F31D66D}" type="slidenum">
               <a:rPr lang="en-US" smtClean="0"/>
-              <a:t>‹#›</a:t>
+              <a:t>‹nº›</a:t>
             </a:fld>
             <a:endParaRPr lang="en-US"/>
           </a:p>
@@ -2176,7 +2176,7 @@
           <a:p>
             <a:fld id="{37B1D8A3-40A5-CC46-B346-36758DE6AE04}" type="datetimeFigureOut">
               <a:rPr lang="en-US" smtClean="0"/>
-              <a:t>7/6/20</a:t>
+              <a:t>3/6/2023</a:t>
             </a:fld>
             <a:endParaRPr lang="en-US"/>
           </a:p>
@@ -2218,7 +2218,7 @@
           <a:p>
             <a:fld id="{1DAA5291-BD98-6C47-AA17-C1290F31D66D}" type="slidenum">
               <a:rPr lang="en-US" smtClean="0"/>
-              <a:t>‹#›</a:t>
+              <a:t>‹nº›</a:t>
             </a:fld>
             <a:endParaRPr lang="en-US"/>
           </a:p>
@@ -2451,7 +2451,7 @@
           <a:p>
             <a:fld id="{37B1D8A3-40A5-CC46-B346-36758DE6AE04}" type="datetimeFigureOut">
               <a:rPr lang="en-US" smtClean="0"/>
-              <a:t>7/6/20</a:t>
+              <a:t>3/6/2023</a:t>
             </a:fld>
             <a:endParaRPr lang="en-US"/>
           </a:p>
@@ -2493,7 +2493,7 @@
           <a:p>
             <a:fld id="{1DAA5291-BD98-6C47-AA17-C1290F31D66D}" type="slidenum">
               <a:rPr lang="en-US" smtClean="0"/>
-              <a:t>‹#›</a:t>
+              <a:t>‹nº›</a:t>
             </a:fld>
             <a:endParaRPr lang="en-US"/>
           </a:p>
@@ -2703,7 +2703,7 @@
           <a:p>
             <a:fld id="{37B1D8A3-40A5-CC46-B346-36758DE6AE04}" type="datetimeFigureOut">
               <a:rPr lang="en-US" smtClean="0"/>
-              <a:t>7/6/20</a:t>
+              <a:t>3/6/2023</a:t>
             </a:fld>
             <a:endParaRPr lang="en-US"/>
           </a:p>
@@ -2745,7 +2745,7 @@
           <a:p>
             <a:fld id="{1DAA5291-BD98-6C47-AA17-C1290F31D66D}" type="slidenum">
               <a:rPr lang="en-US" smtClean="0"/>
-              <a:t>‹#›</a:t>
+              <a:t>‹nº›</a:t>
             </a:fld>
             <a:endParaRPr lang="en-US"/>
           </a:p>
@@ -2914,7 +2914,7 @@
           <a:p>
             <a:fld id="{37B1D8A3-40A5-CC46-B346-36758DE6AE04}" type="datetimeFigureOut">
               <a:rPr lang="en-US" smtClean="0"/>
-              <a:t>7/6/20</a:t>
+              <a:t>3/6/2023</a:t>
             </a:fld>
             <a:endParaRPr lang="en-US"/>
           </a:p>
@@ -2992,7 +2992,7 @@
           <a:p>
             <a:fld id="{1DAA5291-BD98-6C47-AA17-C1290F31D66D}" type="slidenum">
               <a:rPr lang="en-US" smtClean="0"/>
-              <a:t>‹#›</a:t>
+              <a:t>‹nº›</a:t>
             </a:fld>
             <a:endParaRPr lang="en-US"/>
           </a:p>
@@ -20164,9 +20164,9 @@
         <p:grpSpPr>
           <a:xfrm>
             <a:off x="2108011" y="282434"/>
-            <a:ext cx="7657079" cy="6253299"/>
+            <a:ext cx="7721006" cy="6253299"/>
             <a:chOff x="2108011" y="282434"/>
-            <a:chExt cx="7657079" cy="6253299"/>
+            <a:chExt cx="7721006" cy="6253299"/>
           </a:xfrm>
         </p:grpSpPr>
         <p:grpSp>
@@ -20235,7 +20235,7 @@
                 <a:lstStyle/>
                 <a:p>
                   <a:pPr algn="ctr"/>
-                  <a:endParaRPr lang="en-US"/>
+                  <a:endParaRPr lang="en-US" dirty="0"/>
                 </a:p>
               </p:txBody>
             </p:sp>
@@ -20462,7 +20462,7 @@
                 <a:lstStyle/>
                 <a:p>
                   <a:pPr algn="ctr"/>
-                  <a:endParaRPr lang="en-US"/>
+                  <a:endParaRPr lang="en-US" dirty="0"/>
                 </a:p>
               </p:txBody>
             </p:sp>
@@ -20511,7 +20511,7 @@
                 <a:lstStyle/>
                 <a:p>
                   <a:pPr algn="ctr"/>
-                  <a:endParaRPr lang="en-US"/>
+                  <a:endParaRPr lang="en-US" dirty="0"/>
                 </a:p>
               </p:txBody>
             </p:sp>
@@ -20560,7 +20560,7 @@
                 <a:lstStyle/>
                 <a:p>
                   <a:pPr algn="ctr"/>
-                  <a:endParaRPr lang="en-US"/>
+                  <a:endParaRPr lang="en-US" dirty="0"/>
                 </a:p>
               </p:txBody>
             </p:sp>
@@ -20609,7 +20609,7 @@
                 <a:lstStyle/>
                 <a:p>
                   <a:pPr algn="ctr"/>
-                  <a:endParaRPr lang="en-US"/>
+                  <a:endParaRPr lang="en-US" dirty="0"/>
                 </a:p>
               </p:txBody>
             </p:sp>
@@ -20658,7 +20658,7 @@
                 <a:lstStyle/>
                 <a:p>
                   <a:pPr algn="ctr"/>
-                  <a:endParaRPr lang="en-US"/>
+                  <a:endParaRPr lang="en-US" dirty="0"/>
                 </a:p>
               </p:txBody>
             </p:sp>
@@ -20818,7 +20818,7 @@
           <p:spPr>
             <a:xfrm>
               <a:off x="5433536" y="282434"/>
-              <a:ext cx="1243161" cy="369332"/>
+              <a:ext cx="1180451" cy="369332"/>
             </a:xfrm>
             <a:prstGeom prst="rect">
               <a:avLst/>
@@ -20832,8 +20832,8 @@
             <a:lstStyle/>
             <a:p>
               <a:r>
-                <a:rPr lang="en-US" dirty="0"/>
-                <a:t>Technology</a:t>
+                <a:rPr lang="pt-BR" dirty="0"/>
+                <a:t>Tecnologia</a:t>
               </a:r>
             </a:p>
           </p:txBody>
@@ -20992,7 +20992,7 @@
           <p:spPr>
             <a:xfrm>
               <a:off x="8913638" y="2544572"/>
-              <a:ext cx="851452" cy="369332"/>
+              <a:ext cx="915379" cy="369332"/>
             </a:xfrm>
             <a:prstGeom prst="rect">
               <a:avLst/>
@@ -21007,7 +21007,7 @@
             <a:p>
               <a:r>
                 <a:rPr lang="en-US" dirty="0"/>
-                <a:t>System</a:t>
+                <a:t>Sistema</a:t>
               </a:r>
             </a:p>
           </p:txBody>
@@ -21173,7 +21173,7 @@
           <p:spPr>
             <a:xfrm>
               <a:off x="2108011" y="2539804"/>
-              <a:ext cx="1058751" cy="369332"/>
+              <a:ext cx="1106650" cy="369332"/>
             </a:xfrm>
             <a:prstGeom prst="rect">
               <a:avLst/>
@@ -21187,8 +21187,8 @@
             <a:lstStyle/>
             <a:p>
               <a:r>
-                <a:rPr lang="en-US" dirty="0"/>
-                <a:t>Influence</a:t>
+                <a:rPr lang="pt-BR" dirty="0"/>
+                <a:t>Influência</a:t>
               </a:r>
             </a:p>
           </p:txBody>
@@ -21202,7 +21202,7 @@
           <p:spPr>
             <a:xfrm>
               <a:off x="7416824" y="6166401"/>
-              <a:ext cx="826060" cy="369332"/>
+              <a:ext cx="915828" cy="369332"/>
             </a:xfrm>
             <a:prstGeom prst="rect">
               <a:avLst/>
@@ -21216,9 +21216,10 @@
             <a:lstStyle/>
             <a:p>
               <a:r>
-                <a:rPr lang="en-US" dirty="0"/>
-                <a:t>People</a:t>
+                <a:rPr lang="en-US" dirty="0" err="1"/>
+                <a:t>Pessoas</a:t>
               </a:r>
+              <a:endParaRPr lang="en-US" dirty="0"/>
             </a:p>
           </p:txBody>
         </p:sp>
@@ -21231,7 +21232,7 @@
           <p:spPr>
             <a:xfrm>
               <a:off x="3811595" y="6161638"/>
-              <a:ext cx="894284" cy="369332"/>
+              <a:ext cx="1016112" cy="369332"/>
             </a:xfrm>
             <a:prstGeom prst="rect">
               <a:avLst/>
@@ -21245,9 +21246,10 @@
             <a:lstStyle/>
             <a:p>
               <a:r>
-                <a:rPr lang="en-US" dirty="0"/>
-                <a:t>Process</a:t>
+                <a:rPr lang="en-US" dirty="0" err="1"/>
+                <a:t>Processo</a:t>
               </a:r>
+              <a:endParaRPr lang="en-US" dirty="0"/>
             </a:p>
           </p:txBody>
         </p:sp>

</xml_diff>

<commit_message>
Removendo documentos não utilizados. Novo template
</commit_message>
<xml_diff>
--- a/charts/charts.pptx
+++ b/charts/charts.pptx
@@ -10,7 +10,7 @@
   <p:sldIdLst>
     <p:sldId id="292" r:id="rId2"/>
     <p:sldId id="257" r:id="rId3"/>
-    <p:sldId id="274" r:id="rId4"/>
+    <p:sldId id="297" r:id="rId4"/>
     <p:sldId id="275" r:id="rId5"/>
     <p:sldId id="276" r:id="rId6"/>
     <p:sldId id="277" r:id="rId7"/>
@@ -216,7 +216,7 @@
           <a:p>
             <a:fld id="{511DBF38-111F-4C48-93F4-B65DF8B44846}" type="datetimeFigureOut">
               <a:rPr lang="en-US" smtClean="0"/>
-              <a:t>3/6/2023</a:t>
+              <a:t>3/7/2023</a:t>
             </a:fld>
             <a:endParaRPr lang="en-US"/>
           </a:p>
@@ -612,7 +612,7 @@
           <a:p>
             <a:fld id="{37B1D8A3-40A5-CC46-B346-36758DE6AE04}" type="datetimeFigureOut">
               <a:rPr lang="en-US" smtClean="0"/>
-              <a:t>3/6/2023</a:t>
+              <a:t>3/7/2023</a:t>
             </a:fld>
             <a:endParaRPr lang="en-US"/>
           </a:p>
@@ -780,7 +780,7 @@
           <a:p>
             <a:fld id="{37B1D8A3-40A5-CC46-B346-36758DE6AE04}" type="datetimeFigureOut">
               <a:rPr lang="en-US" smtClean="0"/>
-              <a:t>3/6/2023</a:t>
+              <a:t>3/7/2023</a:t>
             </a:fld>
             <a:endParaRPr lang="en-US"/>
           </a:p>
@@ -958,7 +958,7 @@
           <a:p>
             <a:fld id="{37B1D8A3-40A5-CC46-B346-36758DE6AE04}" type="datetimeFigureOut">
               <a:rPr lang="en-US" smtClean="0"/>
-              <a:t>3/6/2023</a:t>
+              <a:t>3/7/2023</a:t>
             </a:fld>
             <a:endParaRPr lang="en-US"/>
           </a:p>
@@ -1126,7 +1126,7 @@
           <a:p>
             <a:fld id="{37B1D8A3-40A5-CC46-B346-36758DE6AE04}" type="datetimeFigureOut">
               <a:rPr lang="en-US" smtClean="0"/>
-              <a:t>3/6/2023</a:t>
+              <a:t>3/7/2023</a:t>
             </a:fld>
             <a:endParaRPr lang="en-US"/>
           </a:p>
@@ -1371,7 +1371,7 @@
           <a:p>
             <a:fld id="{37B1D8A3-40A5-CC46-B346-36758DE6AE04}" type="datetimeFigureOut">
               <a:rPr lang="en-US" smtClean="0"/>
-              <a:t>3/6/2023</a:t>
+              <a:t>3/7/2023</a:t>
             </a:fld>
             <a:endParaRPr lang="en-US"/>
           </a:p>
@@ -1600,7 +1600,7 @@
           <a:p>
             <a:fld id="{37B1D8A3-40A5-CC46-B346-36758DE6AE04}" type="datetimeFigureOut">
               <a:rPr lang="en-US" smtClean="0"/>
-              <a:t>3/6/2023</a:t>
+              <a:t>3/7/2023</a:t>
             </a:fld>
             <a:endParaRPr lang="en-US"/>
           </a:p>
@@ -1964,7 +1964,7 @@
           <a:p>
             <a:fld id="{37B1D8A3-40A5-CC46-B346-36758DE6AE04}" type="datetimeFigureOut">
               <a:rPr lang="en-US" smtClean="0"/>
-              <a:t>3/6/2023</a:t>
+              <a:t>3/7/2023</a:t>
             </a:fld>
             <a:endParaRPr lang="en-US"/>
           </a:p>
@@ -2081,7 +2081,7 @@
           <a:p>
             <a:fld id="{37B1D8A3-40A5-CC46-B346-36758DE6AE04}" type="datetimeFigureOut">
               <a:rPr lang="en-US" smtClean="0"/>
-              <a:t>3/6/2023</a:t>
+              <a:t>3/7/2023</a:t>
             </a:fld>
             <a:endParaRPr lang="en-US"/>
           </a:p>
@@ -2176,7 +2176,7 @@
           <a:p>
             <a:fld id="{37B1D8A3-40A5-CC46-B346-36758DE6AE04}" type="datetimeFigureOut">
               <a:rPr lang="en-US" smtClean="0"/>
-              <a:t>3/6/2023</a:t>
+              <a:t>3/7/2023</a:t>
             </a:fld>
             <a:endParaRPr lang="en-US"/>
           </a:p>
@@ -2451,7 +2451,7 @@
           <a:p>
             <a:fld id="{37B1D8A3-40A5-CC46-B346-36758DE6AE04}" type="datetimeFigureOut">
               <a:rPr lang="en-US" smtClean="0"/>
-              <a:t>3/6/2023</a:t>
+              <a:t>3/7/2023</a:t>
             </a:fld>
             <a:endParaRPr lang="en-US"/>
           </a:p>
@@ -2703,7 +2703,7 @@
           <a:p>
             <a:fld id="{37B1D8A3-40A5-CC46-B346-36758DE6AE04}" type="datetimeFigureOut">
               <a:rPr lang="en-US" smtClean="0"/>
-              <a:t>3/6/2023</a:t>
+              <a:t>3/7/2023</a:t>
             </a:fld>
             <a:endParaRPr lang="en-US"/>
           </a:p>
@@ -2914,7 +2914,7 @@
           <a:p>
             <a:fld id="{37B1D8A3-40A5-CC46-B346-36758DE6AE04}" type="datetimeFigureOut">
               <a:rPr lang="en-US" smtClean="0"/>
-              <a:t>3/6/2023</a:t>
+              <a:t>3/7/2023</a:t>
             </a:fld>
             <a:endParaRPr lang="en-US"/>
           </a:p>
@@ -20411,9 +20411,9 @@
             </p:nvGrpSpPr>
             <p:grpSpPr>
               <a:xfrm>
-                <a:off x="3657243" y="1112014"/>
+                <a:off x="3635286" y="1123431"/>
                 <a:ext cx="4800600" cy="4572000"/>
-                <a:chOff x="3657243" y="1112014"/>
+                <a:chOff x="3635286" y="1123431"/>
                 <a:chExt cx="4800600" cy="4572000"/>
               </a:xfrm>
             </p:grpSpPr>
@@ -20427,7 +20427,7 @@
               </p:nvSpPr>
               <p:spPr>
                 <a:xfrm>
-                  <a:off x="3657243" y="1112014"/>
+                  <a:off x="3635286" y="1123431"/>
                   <a:ext cx="4800600" cy="4572000"/>
                 </a:xfrm>
                 <a:prstGeom prst="pentagon">
@@ -20671,9 +20671,9 @@
             <p:nvPr/>
           </p:nvSpPr>
           <p:spPr>
-            <a:xfrm>
-              <a:off x="6003957" y="2803547"/>
-              <a:ext cx="628057" cy="276999"/>
+            <a:xfrm rot="2181164">
+              <a:off x="5974112" y="2797212"/>
+              <a:ext cx="559512" cy="276999"/>
             </a:xfrm>
             <a:prstGeom prst="rect">
               <a:avLst/>
@@ -20687,9 +20687,10 @@
             <a:lstStyle/>
             <a:p>
               <a:r>
-                <a:rPr lang="en-US" sz="1200" dirty="0"/>
-                <a:t>Adopts</a:t>
+                <a:rPr lang="en-US" sz="1200" dirty="0" err="1"/>
+                <a:t>Adota</a:t>
               </a:r>
+              <a:endParaRPr lang="en-US" sz="1200" dirty="0"/>
             </a:p>
           </p:txBody>
         </p:sp>
@@ -20700,9 +20701,9 @@
             <p:nvPr/>
           </p:nvSpPr>
           <p:spPr>
-            <a:xfrm>
-              <a:off x="5999192" y="2341577"/>
-              <a:ext cx="852926" cy="276999"/>
+            <a:xfrm rot="2165657">
+              <a:off x="5951855" y="2447108"/>
+              <a:ext cx="855362" cy="276999"/>
             </a:xfrm>
             <a:prstGeom prst="rect">
               <a:avLst/>
@@ -20716,9 +20717,10 @@
             <a:lstStyle/>
             <a:p>
               <a:r>
-                <a:rPr lang="en-US" sz="1200" dirty="0"/>
-                <a:t>Specializes</a:t>
+                <a:rPr lang="en-US" sz="1200" dirty="0" err="1"/>
+                <a:t>Especializa</a:t>
               </a:r>
+              <a:endParaRPr lang="en-US" sz="1200" dirty="0"/>
             </a:p>
           </p:txBody>
         </p:sp>
@@ -20729,9 +20731,9 @@
             <p:nvPr/>
           </p:nvSpPr>
           <p:spPr>
-            <a:xfrm>
-              <a:off x="6008712" y="1893895"/>
-              <a:ext cx="890885" cy="276999"/>
+            <a:xfrm rot="2191087">
+              <a:off x="5965194" y="1939634"/>
+              <a:ext cx="827406" cy="276999"/>
             </a:xfrm>
             <a:prstGeom prst="rect">
               <a:avLst/>
@@ -20745,9 +20747,10 @@
             <a:lstStyle/>
             <a:p>
               <a:r>
-                <a:rPr lang="en-US" sz="1200" dirty="0"/>
-                <a:t>Evangelizes</a:t>
+                <a:rPr lang="en-US" sz="1200" dirty="0" err="1"/>
+                <a:t>Evangeliza</a:t>
               </a:r>
+              <a:endParaRPr lang="en-US" sz="1200" dirty="0"/>
             </a:p>
           </p:txBody>
         </p:sp>
@@ -20758,9 +20761,9 @@
             <p:nvPr/>
           </p:nvSpPr>
           <p:spPr>
-            <a:xfrm>
-              <a:off x="6003944" y="1417638"/>
-              <a:ext cx="686983" cy="276999"/>
+            <a:xfrm rot="2078593">
+              <a:off x="5945831" y="1478155"/>
+              <a:ext cx="795859" cy="276999"/>
             </a:xfrm>
             <a:prstGeom prst="rect">
               <a:avLst/>
@@ -20774,9 +20777,10 @@
             <a:lstStyle/>
             <a:p>
               <a:r>
-                <a:rPr lang="en-US" sz="1200" dirty="0"/>
-                <a:t>Masters</a:t>
+                <a:rPr lang="en-US" sz="1200" dirty="0" err="1"/>
+                <a:t>Masteriza</a:t>
               </a:r>
+              <a:endParaRPr lang="en-US" sz="1200" dirty="0"/>
             </a:p>
           </p:txBody>
         </p:sp>
@@ -20787,9 +20791,9 @@
             <p:nvPr/>
           </p:nvSpPr>
           <p:spPr>
-            <a:xfrm>
-              <a:off x="5984888" y="969952"/>
-              <a:ext cx="654218" cy="276999"/>
+            <a:xfrm rot="2052088">
+              <a:off x="5996437" y="1049004"/>
+              <a:ext cx="428322" cy="276999"/>
             </a:xfrm>
             <a:prstGeom prst="rect">
               <a:avLst/>
@@ -20803,9 +20807,10 @@
             <a:lstStyle/>
             <a:p>
               <a:r>
-                <a:rPr lang="en-US" sz="1200" dirty="0"/>
-                <a:t>Creates</a:t>
+                <a:rPr lang="en-US" sz="1200" dirty="0" err="1"/>
+                <a:t>Cria</a:t>
               </a:r>
+              <a:endParaRPr lang="en-US" sz="1200" dirty="0"/>
             </a:p>
           </p:txBody>
         </p:sp>
@@ -20845,9 +20850,9 @@
             <p:nvPr/>
           </p:nvSpPr>
           <p:spPr>
-            <a:xfrm>
-              <a:off x="6084917" y="3356006"/>
-              <a:ext cx="777777" cy="276999"/>
+            <a:xfrm rot="17228096">
+              <a:off x="6128367" y="3459706"/>
+              <a:ext cx="713722" cy="276999"/>
             </a:xfrm>
             <a:prstGeom prst="rect">
               <a:avLst/>
@@ -20861,9 +20866,10 @@
             <a:lstStyle/>
             <a:p>
               <a:r>
-                <a:rPr lang="en-US" sz="1200" dirty="0"/>
-                <a:t>Enhances</a:t>
+                <a:rPr lang="en-US" sz="1200" dirty="0" err="1"/>
+                <a:t>Melhora</a:t>
               </a:r>
+              <a:endParaRPr lang="en-US" sz="1200" dirty="0"/>
             </a:p>
           </p:txBody>
         </p:sp>
@@ -20874,9 +20880,9 @@
             <p:nvPr/>
           </p:nvSpPr>
           <p:spPr>
-            <a:xfrm>
-              <a:off x="6611019" y="3209017"/>
-              <a:ext cx="665567" cy="276999"/>
+            <a:xfrm rot="16901992">
+              <a:off x="6679841" y="3293057"/>
+              <a:ext cx="633122" cy="276999"/>
             </a:xfrm>
             <a:prstGeom prst="rect">
               <a:avLst/>
@@ -20890,9 +20896,10 @@
             <a:lstStyle/>
             <a:p>
               <a:r>
-                <a:rPr lang="en-US" sz="1200" dirty="0"/>
-                <a:t>Designs</a:t>
+                <a:rPr lang="en-US" sz="1200" dirty="0" err="1"/>
+                <a:t>Projeta</a:t>
               </a:r>
+              <a:endParaRPr lang="en-US" sz="1200" dirty="0"/>
             </a:p>
           </p:txBody>
         </p:sp>
@@ -20903,9 +20910,9 @@
             <p:nvPr/>
           </p:nvSpPr>
           <p:spPr>
-            <a:xfrm>
-              <a:off x="7106326" y="3089946"/>
-              <a:ext cx="538930" cy="276999"/>
+            <a:xfrm rot="17128731">
+              <a:off x="7176647" y="3212065"/>
+              <a:ext cx="673582" cy="276999"/>
             </a:xfrm>
             <a:prstGeom prst="rect">
               <a:avLst/>
@@ -20919,9 +20926,10 @@
             <a:lstStyle/>
             <a:p>
               <a:r>
-                <a:rPr lang="en-US" sz="1200" dirty="0"/>
-                <a:t>Owns</a:t>
+                <a:rPr lang="en-US" sz="1200" dirty="0" err="1"/>
+                <a:t>Domina</a:t>
               </a:r>
+              <a:endParaRPr lang="en-US" sz="1200" dirty="0"/>
             </a:p>
           </p:txBody>
         </p:sp>
@@ -20932,9 +20940,9 @@
             <p:nvPr/>
           </p:nvSpPr>
           <p:spPr>
-            <a:xfrm>
-              <a:off x="7558768" y="2985171"/>
-              <a:ext cx="646395" cy="276999"/>
+            <a:xfrm rot="17205988">
+              <a:off x="7696404" y="3048843"/>
+              <a:ext cx="556371" cy="276999"/>
             </a:xfrm>
             <a:prstGeom prst="rect">
               <a:avLst/>
@@ -20948,9 +20956,10 @@
             <a:lstStyle/>
             <a:p>
               <a:r>
-                <a:rPr lang="en-US" sz="1200" dirty="0"/>
-                <a:t>Evolves</a:t>
+                <a:rPr lang="en-US" sz="1200" dirty="0" err="1"/>
+                <a:t>Evolui</a:t>
               </a:r>
+              <a:endParaRPr lang="en-US" sz="1200" dirty="0"/>
             </a:p>
           </p:txBody>
         </p:sp>
@@ -20961,9 +20970,9 @@
             <p:nvPr/>
           </p:nvSpPr>
           <p:spPr>
-            <a:xfrm>
-              <a:off x="8139796" y="2866103"/>
-              <a:ext cx="540533" cy="276999"/>
+            <a:xfrm rot="17314599">
+              <a:off x="8173618" y="2923619"/>
+              <a:ext cx="564642" cy="276999"/>
             </a:xfrm>
             <a:prstGeom prst="rect">
               <a:avLst/>
@@ -20977,9 +20986,10 @@
             <a:lstStyle/>
             <a:p>
               <a:r>
-                <a:rPr lang="en-US" sz="1200" dirty="0"/>
-                <a:t>Leads</a:t>
+                <a:rPr lang="en-US" sz="1200" dirty="0" err="1"/>
+                <a:t>Lidera</a:t>
               </a:r>
+              <a:endParaRPr lang="en-US" sz="1200" dirty="0"/>
             </a:p>
           </p:txBody>
         </p:sp>
@@ -21019,9 +21029,9 @@
             <p:nvPr/>
           </p:nvSpPr>
           <p:spPr>
-            <a:xfrm>
-              <a:off x="5165741" y="2994048"/>
-              <a:ext cx="849913" cy="276999"/>
+            <a:xfrm rot="19458038">
+              <a:off x="5361351" y="2916243"/>
+              <a:ext cx="673389" cy="276999"/>
             </a:xfrm>
             <a:prstGeom prst="rect">
               <a:avLst/>
@@ -21036,7 +21046,7 @@
             <a:p>
               <a:r>
                 <a:rPr lang="en-US" sz="1200" dirty="0"/>
-                <a:t>Subsystem</a:t>
+                <a:t>Sistema</a:t>
               </a:r>
             </a:p>
           </p:txBody>
@@ -21048,74 +21058,9 @@
             <p:nvPr/>
           </p:nvSpPr>
           <p:spPr>
-            <a:xfrm>
-              <a:off x="5018106" y="2803542"/>
-              <a:ext cx="520592" cy="276999"/>
-            </a:xfrm>
-            <a:prstGeom prst="rect">
-              <a:avLst/>
-            </a:prstGeom>
-            <a:noFill/>
-          </p:spPr>
-          <p:txBody>
-            <a:bodyPr wrap="none" rtlCol="0">
-              <a:spAutoFit/>
-            </a:bodyPr>
-            <a:lstStyle/>
-            <a:p>
-              <a:r>
-                <a:rPr lang="en-US" sz="1200"/>
-                <a:t>Team</a:t>
-              </a:r>
-              <a:endParaRPr lang="en-US" sz="1200" dirty="0"/>
-            </a:p>
-          </p:txBody>
-        </p:sp>
-        <p:sp>
-          <p:nvSpPr>
-            <p:cNvPr id="71" name="TextBox 70"/>
-            <p:cNvSpPr txBox="1"/>
-            <p:nvPr/>
-          </p:nvSpPr>
-          <p:spPr>
-            <a:xfrm>
-              <a:off x="4498988" y="2598752"/>
-              <a:ext cx="745717" cy="461665"/>
-            </a:xfrm>
-            <a:prstGeom prst="rect">
-              <a:avLst/>
-            </a:prstGeom>
-            <a:noFill/>
-          </p:spPr>
-          <p:txBody>
-            <a:bodyPr wrap="none" rtlCol="0">
-              <a:spAutoFit/>
-            </a:bodyPr>
-            <a:lstStyle/>
-            <a:p>
-              <a:r>
-                <a:rPr lang="en-US" sz="1200"/>
-                <a:t>Multiple </a:t>
-              </a:r>
-            </a:p>
-            <a:p>
-              <a:r>
-                <a:rPr lang="en-US" sz="1200" dirty="0"/>
-                <a:t>Teams</a:t>
-              </a:r>
-            </a:p>
-          </p:txBody>
-        </p:sp>
-        <p:sp>
-          <p:nvSpPr>
-            <p:cNvPr id="73" name="TextBox 72"/>
-            <p:cNvSpPr txBox="1"/>
-            <p:nvPr/>
-          </p:nvSpPr>
-          <p:spPr>
-            <a:xfrm>
-              <a:off x="3779843" y="2636848"/>
-              <a:ext cx="771814" cy="276999"/>
+            <a:xfrm rot="19435103">
+              <a:off x="4896196" y="2819942"/>
+              <a:ext cx="610424" cy="276999"/>
             </a:xfrm>
             <a:prstGeom prst="rect">
               <a:avLst/>
@@ -21130,21 +21075,21 @@
             <a:p>
               <a:r>
                 <a:rPr lang="en-US" sz="1200" dirty="0"/>
-                <a:t>Company</a:t>
+                <a:t>Equipe</a:t>
               </a:r>
             </a:p>
           </p:txBody>
         </p:sp>
         <p:sp>
           <p:nvSpPr>
-            <p:cNvPr id="74" name="TextBox 73"/>
+            <p:cNvPr id="71" name="TextBox 70"/>
             <p:cNvSpPr txBox="1"/>
             <p:nvPr/>
           </p:nvSpPr>
           <p:spPr>
-            <a:xfrm>
-              <a:off x="3460644" y="2433616"/>
-              <a:ext cx="910827" cy="276999"/>
+            <a:xfrm rot="19390348">
+              <a:off x="4357327" y="2503991"/>
+              <a:ext cx="768159" cy="461665"/>
             </a:xfrm>
             <a:prstGeom prst="rect">
               <a:avLst/>
@@ -21159,8 +21104,76 @@
             <a:p>
               <a:r>
                 <a:rPr lang="en-US" sz="1200" dirty="0"/>
-                <a:t>Community</a:t>
+                <a:t>Equipes</a:t>
               </a:r>
+              <a:br>
+                <a:rPr lang="en-US" sz="1200" dirty="0"/>
+              </a:br>
+              <a:r>
+                <a:rPr lang="en-US" sz="1200" dirty="0" err="1"/>
+                <a:t>Múltiplas</a:t>
+              </a:r>
+              <a:endParaRPr lang="en-US" sz="1200" dirty="0"/>
+            </a:p>
+          </p:txBody>
+        </p:sp>
+        <p:sp>
+          <p:nvSpPr>
+            <p:cNvPr id="73" name="TextBox 72"/>
+            <p:cNvSpPr txBox="1"/>
+            <p:nvPr/>
+          </p:nvSpPr>
+          <p:spPr>
+            <a:xfrm rot="19576326">
+              <a:off x="3900758" y="2573895"/>
+              <a:ext cx="726033" cy="276999"/>
+            </a:xfrm>
+            <a:prstGeom prst="rect">
+              <a:avLst/>
+            </a:prstGeom>
+            <a:noFill/>
+          </p:spPr>
+          <p:txBody>
+            <a:bodyPr wrap="none" rtlCol="0">
+              <a:spAutoFit/>
+            </a:bodyPr>
+            <a:lstStyle/>
+            <a:p>
+              <a:r>
+                <a:rPr lang="en-US" sz="1200" dirty="0" err="1"/>
+                <a:t>Empresa</a:t>
+              </a:r>
+              <a:endParaRPr lang="en-US" sz="1200" dirty="0"/>
+            </a:p>
+          </p:txBody>
+        </p:sp>
+        <p:sp>
+          <p:nvSpPr>
+            <p:cNvPr id="74" name="TextBox 73"/>
+            <p:cNvSpPr txBox="1"/>
+            <p:nvPr/>
+          </p:nvSpPr>
+          <p:spPr>
+            <a:xfrm rot="19518351">
+              <a:off x="3435707" y="2406072"/>
+              <a:ext cx="978153" cy="276999"/>
+            </a:xfrm>
+            <a:prstGeom prst="rect">
+              <a:avLst/>
+            </a:prstGeom>
+            <a:noFill/>
+          </p:spPr>
+          <p:txBody>
+            <a:bodyPr wrap="none" rtlCol="0">
+              <a:spAutoFit/>
+            </a:bodyPr>
+            <a:lstStyle/>
+            <a:p>
+              <a:r>
+                <a:rPr lang="en-US" sz="1200" dirty="0" err="1"/>
+                <a:t>Comunidade</a:t>
+              </a:r>
+              <a:endParaRPr lang="en-US" sz="1200" dirty="0"/>
             </a:p>
           </p:txBody>
         </p:sp>
@@ -21261,8 +21274,158 @@
           </p:nvSpPr>
           <p:spPr>
             <a:xfrm>
-              <a:off x="5731357" y="3700439"/>
-              <a:ext cx="593432" cy="276999"/>
+              <a:off x="5725106" y="3778238"/>
+              <a:ext cx="719621" cy="276999"/>
+            </a:xfrm>
+            <a:prstGeom prst="rect">
+              <a:avLst/>
+            </a:prstGeom>
+            <a:noFill/>
+          </p:spPr>
+          <p:txBody>
+            <a:bodyPr wrap="none" rtlCol="0">
+              <a:spAutoFit/>
+            </a:bodyPr>
+            <a:lstStyle/>
+            <a:p>
+              <a:r>
+                <a:rPr lang="en-US" sz="1200" dirty="0" err="1"/>
+                <a:t>Aprende</a:t>
+              </a:r>
+              <a:endParaRPr lang="en-US" sz="1200" dirty="0"/>
+            </a:p>
+          </p:txBody>
+        </p:sp>
+        <p:sp>
+          <p:nvSpPr>
+            <p:cNvPr id="79" name="TextBox 78"/>
+            <p:cNvSpPr txBox="1"/>
+            <p:nvPr/>
+          </p:nvSpPr>
+          <p:spPr>
+            <a:xfrm>
+              <a:off x="6076547" y="4262210"/>
+              <a:ext cx="673326" cy="276999"/>
+            </a:xfrm>
+            <a:prstGeom prst="rect">
+              <a:avLst/>
+            </a:prstGeom>
+            <a:noFill/>
+          </p:spPr>
+          <p:txBody>
+            <a:bodyPr wrap="none" rtlCol="0">
+              <a:spAutoFit/>
+            </a:bodyPr>
+            <a:lstStyle/>
+            <a:p>
+              <a:r>
+                <a:rPr lang="en-US" sz="1200" dirty="0" err="1"/>
+                <a:t>Suporta</a:t>
+              </a:r>
+              <a:endParaRPr lang="en-US" sz="1200" dirty="0"/>
+            </a:p>
+          </p:txBody>
+        </p:sp>
+        <p:sp>
+          <p:nvSpPr>
+            <p:cNvPr id="80" name="TextBox 79"/>
+            <p:cNvSpPr txBox="1"/>
+            <p:nvPr/>
+          </p:nvSpPr>
+          <p:spPr>
+            <a:xfrm>
+              <a:off x="6325443" y="4691461"/>
+              <a:ext cx="726866" cy="276999"/>
+            </a:xfrm>
+            <a:prstGeom prst="rect">
+              <a:avLst/>
+            </a:prstGeom>
+            <a:noFill/>
+          </p:spPr>
+          <p:txBody>
+            <a:bodyPr wrap="none" rtlCol="0">
+              <a:spAutoFit/>
+            </a:bodyPr>
+            <a:lstStyle/>
+            <a:p>
+              <a:r>
+                <a:rPr lang="en-US" sz="1200" dirty="0" err="1"/>
+                <a:t>Mentora</a:t>
+              </a:r>
+              <a:endParaRPr lang="en-US" sz="1200" dirty="0"/>
+            </a:p>
+          </p:txBody>
+        </p:sp>
+        <p:sp>
+          <p:nvSpPr>
+            <p:cNvPr id="81" name="TextBox 80"/>
+            <p:cNvSpPr txBox="1"/>
+            <p:nvPr/>
+          </p:nvSpPr>
+          <p:spPr>
+            <a:xfrm>
+              <a:off x="6539273" y="5126626"/>
+              <a:ext cx="791692" cy="276999"/>
+            </a:xfrm>
+            <a:prstGeom prst="rect">
+              <a:avLst/>
+            </a:prstGeom>
+            <a:noFill/>
+          </p:spPr>
+          <p:txBody>
+            <a:bodyPr wrap="none" rtlCol="0">
+              <a:spAutoFit/>
+            </a:bodyPr>
+            <a:lstStyle/>
+            <a:p>
+              <a:r>
+                <a:rPr lang="en-US" sz="1200" dirty="0" err="1"/>
+                <a:t>Coordena</a:t>
+              </a:r>
+              <a:endParaRPr lang="en-US" sz="1200" dirty="0"/>
+            </a:p>
+          </p:txBody>
+        </p:sp>
+        <p:sp>
+          <p:nvSpPr>
+            <p:cNvPr id="82" name="TextBox 81"/>
+            <p:cNvSpPr txBox="1"/>
+            <p:nvPr/>
+          </p:nvSpPr>
+          <p:spPr>
+            <a:xfrm>
+              <a:off x="6914730" y="5628009"/>
+              <a:ext cx="742063" cy="276999"/>
+            </a:xfrm>
+            <a:prstGeom prst="rect">
+              <a:avLst/>
+            </a:prstGeom>
+            <a:noFill/>
+          </p:spPr>
+          <p:txBody>
+            <a:bodyPr wrap="none" rtlCol="0">
+              <a:spAutoFit/>
+            </a:bodyPr>
+            <a:lstStyle/>
+            <a:p>
+              <a:r>
+                <a:rPr lang="en-US" sz="1200" dirty="0" err="1"/>
+                <a:t>Gerencia</a:t>
+              </a:r>
+              <a:endParaRPr lang="en-US" sz="1200" dirty="0"/>
+            </a:p>
+          </p:txBody>
+        </p:sp>
+        <p:sp>
+          <p:nvSpPr>
+            <p:cNvPr id="83" name="TextBox 82"/>
+            <p:cNvSpPr txBox="1"/>
+            <p:nvPr/>
+          </p:nvSpPr>
+          <p:spPr>
+            <a:xfrm rot="4210315">
+              <a:off x="5334951" y="3556638"/>
+              <a:ext cx="561372" cy="276999"/>
             </a:xfrm>
             <a:prstGeom prst="rect">
               <a:avLst/>
@@ -21277,21 +21440,22 @@
             <a:p>
               <a:r>
                 <a:rPr lang="en-US" sz="1200" dirty="0"/>
-                <a:t>Learns</a:t>
+                <a:t>Segue</a:t>
               </a:r>
+              <a:endParaRPr lang="en-US" sz="1100" dirty="0"/>
             </a:p>
           </p:txBody>
         </p:sp>
         <p:sp>
           <p:nvSpPr>
-            <p:cNvPr id="79" name="TextBox 78"/>
+            <p:cNvPr id="84" name="TextBox 83"/>
             <p:cNvSpPr txBox="1"/>
             <p:nvPr/>
           </p:nvSpPr>
           <p:spPr>
-            <a:xfrm>
-              <a:off x="5869469" y="4167166"/>
-              <a:ext cx="742511" cy="276999"/>
+            <a:xfrm rot="4293150">
+              <a:off x="5036454" y="4014031"/>
+              <a:ext cx="563296" cy="276999"/>
             </a:xfrm>
             <a:prstGeom prst="rect">
               <a:avLst/>
@@ -21305,8 +21469,8 @@
             <a:lstStyle/>
             <a:p>
               <a:r>
-                <a:rPr lang="en-US" sz="1200"/>
-                <a:t>Supports</a:t>
+                <a:rPr lang="en-US" sz="1200" dirty="0" err="1"/>
+                <a:t>Aplica</a:t>
               </a:r>
               <a:endParaRPr lang="en-US" sz="1200" dirty="0"/>
             </a:p>
@@ -21314,14 +21478,14 @@
         </p:sp>
         <p:sp>
           <p:nvSpPr>
-            <p:cNvPr id="80" name="TextBox 79"/>
+            <p:cNvPr id="85" name="TextBox 84"/>
             <p:cNvSpPr txBox="1"/>
             <p:nvPr/>
           </p:nvSpPr>
           <p:spPr>
-            <a:xfrm>
-              <a:off x="6221886" y="4605321"/>
-              <a:ext cx="714619" cy="276999"/>
+            <a:xfrm rot="4124180">
+              <a:off x="4689041" y="4427251"/>
+              <a:ext cx="645433" cy="276999"/>
             </a:xfrm>
             <a:prstGeom prst="rect">
               <a:avLst/>
@@ -21335,8 +21499,8 @@
             <a:lstStyle/>
             <a:p>
               <a:r>
-                <a:rPr lang="en-US" sz="1200"/>
-                <a:t>Mentors</a:t>
+                <a:rPr lang="en-US" sz="1200" dirty="0" err="1"/>
+                <a:t>Desafia</a:t>
               </a:r>
               <a:endParaRPr lang="en-US" sz="1200" dirty="0"/>
             </a:p>
@@ -21344,14 +21508,14 @@
         </p:sp>
         <p:sp>
           <p:nvSpPr>
-            <p:cNvPr id="81" name="TextBox 80"/>
+            <p:cNvPr id="86" name="TextBox 85"/>
             <p:cNvSpPr txBox="1"/>
             <p:nvPr/>
           </p:nvSpPr>
           <p:spPr>
-            <a:xfrm>
-              <a:off x="6231406" y="5057759"/>
-              <a:ext cx="936347" cy="276999"/>
+            <a:xfrm rot="4328861">
+              <a:off x="4427961" y="4921645"/>
+              <a:ext cx="573811" cy="276999"/>
             </a:xfrm>
             <a:prstGeom prst="rect">
               <a:avLst/>
@@ -21365,8 +21529,8 @@
             <a:lstStyle/>
             <a:p>
               <a:r>
-                <a:rPr lang="en-US" sz="1200"/>
-                <a:t>Coordinates</a:t>
+                <a:rPr lang="en-US" sz="1200" dirty="0" err="1"/>
+                <a:t>Ajusta</a:t>
               </a:r>
               <a:endParaRPr lang="en-US" sz="1200" dirty="0"/>
             </a:p>
@@ -21374,14 +21538,14 @@
         </p:sp>
         <p:sp>
           <p:nvSpPr>
-            <p:cNvPr id="82" name="TextBox 81"/>
+            <p:cNvPr id="87" name="TextBox 86"/>
             <p:cNvSpPr txBox="1"/>
             <p:nvPr/>
           </p:nvSpPr>
           <p:spPr>
-            <a:xfrm>
-              <a:off x="6755282" y="5538771"/>
-              <a:ext cx="752514" cy="276999"/>
+            <a:xfrm rot="4334450">
+              <a:off x="4107613" y="5414777"/>
+              <a:ext cx="593689" cy="276999"/>
             </a:xfrm>
             <a:prstGeom prst="rect">
               <a:avLst/>
@@ -21396,159 +21560,7 @@
             <a:p>
               <a:r>
                 <a:rPr lang="en-US" sz="1200" dirty="0"/>
-                <a:t>Manages</a:t>
-              </a:r>
-            </a:p>
-          </p:txBody>
-        </p:sp>
-        <p:sp>
-          <p:nvSpPr>
-            <p:cNvPr id="83" name="TextBox 82"/>
-            <p:cNvSpPr txBox="1"/>
-            <p:nvPr/>
-          </p:nvSpPr>
-          <p:spPr>
-            <a:xfrm>
-              <a:off x="5093248" y="3692361"/>
-              <a:ext cx="657103" cy="276999"/>
-            </a:xfrm>
-            <a:prstGeom prst="rect">
-              <a:avLst/>
-            </a:prstGeom>
-            <a:noFill/>
-          </p:spPr>
-          <p:txBody>
-            <a:bodyPr wrap="none" rtlCol="0">
-              <a:spAutoFit/>
-            </a:bodyPr>
-            <a:lstStyle/>
-            <a:p>
-              <a:r>
-                <a:rPr lang="en-US" sz="1200" dirty="0"/>
-                <a:t>Follows</a:t>
-              </a:r>
-              <a:endParaRPr lang="en-US" sz="1100" dirty="0"/>
-            </a:p>
-          </p:txBody>
-        </p:sp>
-        <p:sp>
-          <p:nvSpPr>
-            <p:cNvPr id="84" name="TextBox 83"/>
-            <p:cNvSpPr txBox="1"/>
-            <p:nvPr/>
-          </p:nvSpPr>
-          <p:spPr>
-            <a:xfrm>
-              <a:off x="4717010" y="4144803"/>
-              <a:ext cx="718851" cy="276999"/>
-            </a:xfrm>
-            <a:prstGeom prst="rect">
-              <a:avLst/>
-            </a:prstGeom>
-            <a:noFill/>
-          </p:spPr>
-          <p:txBody>
-            <a:bodyPr wrap="none" rtlCol="0">
-              <a:spAutoFit/>
-            </a:bodyPr>
-            <a:lstStyle/>
-            <a:p>
-              <a:r>
-                <a:rPr lang="en-US" sz="1200" dirty="0"/>
-                <a:t>Enforces</a:t>
-              </a:r>
-            </a:p>
-          </p:txBody>
-        </p:sp>
-        <p:sp>
-          <p:nvSpPr>
-            <p:cNvPr id="85" name="TextBox 84"/>
-            <p:cNvSpPr txBox="1"/>
-            <p:nvPr/>
-          </p:nvSpPr>
-          <p:spPr>
-            <a:xfrm>
-              <a:off x="4269331" y="4582958"/>
-              <a:ext cx="856709" cy="276999"/>
-            </a:xfrm>
-            <a:prstGeom prst="rect">
-              <a:avLst/>
-            </a:prstGeom>
-            <a:noFill/>
-          </p:spPr>
-          <p:txBody>
-            <a:bodyPr wrap="none" rtlCol="0">
-              <a:spAutoFit/>
-            </a:bodyPr>
-            <a:lstStyle/>
-            <a:p>
-              <a:r>
-                <a:rPr lang="en-US" sz="1200" dirty="0"/>
-                <a:t>Challenges</a:t>
-              </a:r>
-            </a:p>
-          </p:txBody>
-        </p:sp>
-        <p:sp>
-          <p:nvSpPr>
-            <p:cNvPr id="86" name="TextBox 85"/>
-            <p:cNvSpPr txBox="1"/>
-            <p:nvPr/>
-          </p:nvSpPr>
-          <p:spPr>
-            <a:xfrm>
-              <a:off x="4221713" y="5049688"/>
-              <a:ext cx="643061" cy="276999"/>
-            </a:xfrm>
-            <a:prstGeom prst="rect">
-              <a:avLst/>
-            </a:prstGeom>
-            <a:noFill/>
-          </p:spPr>
-          <p:txBody>
-            <a:bodyPr wrap="none" rtlCol="0">
-              <a:spAutoFit/>
-            </a:bodyPr>
-            <a:lstStyle/>
-            <a:p>
-              <a:r>
-                <a:rPr lang="en-US" sz="1200" dirty="0"/>
-                <a:t>Adjusts</a:t>
-              </a:r>
-            </a:p>
-          </p:txBody>
-        </p:sp>
-        <p:sp>
-          <p:nvSpPr>
-            <p:cNvPr id="87" name="TextBox 86"/>
-            <p:cNvSpPr txBox="1"/>
-            <p:nvPr/>
-          </p:nvSpPr>
-          <p:spPr>
-            <a:xfrm>
-              <a:off x="4102658" y="5373536"/>
-              <a:ext cx="484428" cy="461665"/>
-            </a:xfrm>
-            <a:prstGeom prst="rect">
-              <a:avLst/>
-            </a:prstGeom>
-            <a:noFill/>
-          </p:spPr>
-          <p:txBody>
-            <a:bodyPr wrap="none" rtlCol="0">
-              <a:spAutoFit/>
-            </a:bodyPr>
-            <a:lstStyle/>
-            <a:p>
-              <a:r>
-                <a:rPr lang="en-US" sz="1200" dirty="0"/>
-                <a:t>De-</a:t>
-              </a:r>
-            </a:p>
-            <a:p>
-              <a:r>
-                <a:rPr lang="en-US" sz="1200" dirty="0"/>
-                <a:t>fines</a:t>
+                <a:t>Define</a:t>
               </a:r>
             </a:p>
           </p:txBody>
@@ -23272,1651 +23284,1679 @@
       </p:grpSpPr>
       <p:grpSp>
         <p:nvGrpSpPr>
-          <p:cNvPr id="8" name="Group 7"/>
+          <p:cNvPr id="88" name="Group 87"/>
           <p:cNvGrpSpPr/>
           <p:nvPr/>
         </p:nvGrpSpPr>
         <p:grpSpPr>
           <a:xfrm>
-            <a:off x="2108011" y="279824"/>
-            <a:ext cx="7657079" cy="6255909"/>
-            <a:chOff x="2108011" y="279824"/>
-            <a:chExt cx="7657079" cy="6255909"/>
+            <a:off x="2108011" y="282434"/>
+            <a:ext cx="7721006" cy="6253299"/>
+            <a:chOff x="2108011" y="282434"/>
+            <a:chExt cx="7721006" cy="6253299"/>
           </a:xfrm>
         </p:grpSpPr>
         <p:grpSp>
           <p:nvGrpSpPr>
-            <p:cNvPr id="48" name="Group 47"/>
+            <p:cNvPr id="56" name="Group 55"/>
             <p:cNvGrpSpPr/>
             <p:nvPr/>
           </p:nvGrpSpPr>
           <p:grpSpPr>
             <a:xfrm>
-              <a:off x="5566762" y="2943148"/>
-              <a:ext cx="974406" cy="914481"/>
-              <a:chOff x="5566762" y="2943148"/>
-              <a:chExt cx="974406" cy="914481"/>
+              <a:off x="3171825" y="657224"/>
+              <a:ext cx="5760720" cy="5486400"/>
+              <a:chOff x="3171825" y="657224"/>
+              <a:chExt cx="5760720" cy="5486400"/>
             </a:xfrm>
           </p:grpSpPr>
-          <p:cxnSp>
-            <p:nvCxnSpPr>
-              <p:cNvPr id="63" name="Straight Connector 62"/>
-              <p:cNvCxnSpPr>
-                <a:endCxn id="53" idx="1"/>
-              </p:cNvCxnSpPr>
-              <p:nvPr/>
-            </p:nvCxnSpPr>
-            <p:spPr>
-              <a:xfrm flipH="1">
-                <a:off x="5566762" y="2957436"/>
-                <a:ext cx="451483" cy="320776"/>
-              </a:xfrm>
-              <a:prstGeom prst="line">
-                <a:avLst/>
-              </a:prstGeom>
-              <a:ln w="25400">
-                <a:solidFill>
-                  <a:srgbClr val="00B0F0"/>
-                </a:solidFill>
-              </a:ln>
-            </p:spPr>
-            <p:style>
-              <a:lnRef idx="1">
-                <a:schemeClr val="accent1"/>
-              </a:lnRef>
-              <a:fillRef idx="0">
-                <a:schemeClr val="accent1"/>
-              </a:fillRef>
-              <a:effectRef idx="0">
-                <a:schemeClr val="accent1"/>
-              </a:effectRef>
-              <a:fontRef idx="minor">
-                <a:schemeClr val="tx1"/>
-              </a:fontRef>
-            </p:style>
-          </p:cxnSp>
-          <p:cxnSp>
-            <p:nvCxnSpPr>
-              <p:cNvPr id="72" name="Straight Connector 71"/>
-              <p:cNvCxnSpPr/>
-              <p:nvPr/>
-            </p:nvCxnSpPr>
-            <p:spPr>
-              <a:xfrm>
-                <a:off x="6032533" y="2943148"/>
-                <a:ext cx="508635" cy="320776"/>
-              </a:xfrm>
-              <a:prstGeom prst="line">
-                <a:avLst/>
-              </a:prstGeom>
-              <a:ln w="25400">
-                <a:solidFill>
-                  <a:srgbClr val="00B0F0"/>
-                </a:solidFill>
-              </a:ln>
-            </p:spPr>
-            <p:style>
-              <a:lnRef idx="1">
-                <a:schemeClr val="accent1"/>
-              </a:lnRef>
-              <a:fillRef idx="0">
-                <a:schemeClr val="accent1"/>
-              </a:fillRef>
-              <a:effectRef idx="0">
-                <a:schemeClr val="accent1"/>
-              </a:effectRef>
-              <a:fontRef idx="minor">
-                <a:schemeClr val="tx1"/>
-              </a:fontRef>
-            </p:style>
-          </p:cxnSp>
-          <p:cxnSp>
-            <p:nvCxnSpPr>
-              <p:cNvPr id="89" name="Straight Connector 88"/>
-              <p:cNvCxnSpPr/>
-              <p:nvPr/>
-            </p:nvCxnSpPr>
-            <p:spPr>
-              <a:xfrm flipH="1" flipV="1">
-                <a:off x="5566762" y="3278212"/>
-                <a:ext cx="202805" cy="579417"/>
-              </a:xfrm>
-              <a:prstGeom prst="line">
-                <a:avLst/>
-              </a:prstGeom>
-              <a:ln w="25400">
-                <a:solidFill>
-                  <a:srgbClr val="00B0F0"/>
-                </a:solidFill>
-              </a:ln>
-            </p:spPr>
-            <p:style>
-              <a:lnRef idx="1">
-                <a:schemeClr val="accent1"/>
-              </a:lnRef>
-              <a:fillRef idx="0">
-                <a:schemeClr val="accent1"/>
-              </a:fillRef>
-              <a:effectRef idx="0">
-                <a:schemeClr val="accent1"/>
-              </a:effectRef>
-              <a:fontRef idx="minor">
-                <a:schemeClr val="tx1"/>
-              </a:fontRef>
-            </p:style>
-          </p:cxnSp>
-          <p:cxnSp>
-            <p:nvCxnSpPr>
-              <p:cNvPr id="90" name="Straight Connector 89"/>
-              <p:cNvCxnSpPr/>
-              <p:nvPr/>
-            </p:nvCxnSpPr>
-            <p:spPr>
-              <a:xfrm>
-                <a:off x="5769567" y="3846250"/>
-                <a:ext cx="573947" cy="11379"/>
-              </a:xfrm>
-              <a:prstGeom prst="line">
-                <a:avLst/>
-              </a:prstGeom>
-              <a:ln w="25400">
-                <a:solidFill>
-                  <a:srgbClr val="00B0F0"/>
-                </a:solidFill>
-              </a:ln>
-            </p:spPr>
-            <p:style>
-              <a:lnRef idx="1">
-                <a:schemeClr val="accent1"/>
-              </a:lnRef>
-              <a:fillRef idx="0">
-                <a:schemeClr val="accent1"/>
-              </a:fillRef>
-              <a:effectRef idx="0">
-                <a:schemeClr val="accent1"/>
-              </a:effectRef>
-              <a:fontRef idx="minor">
-                <a:schemeClr val="tx1"/>
-              </a:fontRef>
-            </p:style>
-          </p:cxnSp>
-          <p:cxnSp>
-            <p:nvCxnSpPr>
-              <p:cNvPr id="91" name="Straight Connector 90"/>
-              <p:cNvCxnSpPr/>
-              <p:nvPr/>
-            </p:nvCxnSpPr>
-            <p:spPr>
-              <a:xfrm flipH="1">
-                <a:off x="6343514" y="3278212"/>
-                <a:ext cx="183366" cy="579417"/>
-              </a:xfrm>
-              <a:prstGeom prst="line">
-                <a:avLst/>
-              </a:prstGeom>
-              <a:ln w="25400">
-                <a:solidFill>
-                  <a:srgbClr val="00B0F0"/>
-                </a:solidFill>
-              </a:ln>
-            </p:spPr>
-            <p:style>
-              <a:lnRef idx="1">
-                <a:schemeClr val="accent1"/>
-              </a:lnRef>
-              <a:fillRef idx="0">
-                <a:schemeClr val="accent1"/>
-              </a:fillRef>
-              <a:effectRef idx="0">
-                <a:schemeClr val="accent1"/>
-              </a:effectRef>
-              <a:fontRef idx="minor">
-                <a:schemeClr val="tx1"/>
-              </a:fontRef>
-            </p:style>
-          </p:cxnSp>
+          <p:grpSp>
+            <p:nvGrpSpPr>
+              <p:cNvPr id="47" name="Group 46"/>
+              <p:cNvGrpSpPr/>
+              <p:nvPr/>
+            </p:nvGrpSpPr>
+            <p:grpSpPr>
+              <a:xfrm>
+                <a:off x="3171825" y="657224"/>
+                <a:ext cx="5760720" cy="5486400"/>
+                <a:chOff x="3171825" y="657224"/>
+                <a:chExt cx="5760720" cy="5486400"/>
+              </a:xfrm>
+            </p:grpSpPr>
+            <p:sp>
+              <p:nvSpPr>
+                <p:cNvPr id="30" name="Regular Pentagon 29"/>
+                <p:cNvSpPr>
+                  <a:spLocks noChangeAspect="1"/>
+                </p:cNvSpPr>
+                <p:nvPr/>
+              </p:nvSpPr>
+              <p:spPr>
+                <a:xfrm>
+                  <a:off x="3171825" y="657224"/>
+                  <a:ext cx="5760720" cy="5486400"/>
+                </a:xfrm>
+                <a:prstGeom prst="pentagon">
+                  <a:avLst/>
+                </a:prstGeom>
+                <a:noFill/>
+                <a:ln w="19050"/>
+              </p:spPr>
+              <p:style>
+                <a:lnRef idx="2">
+                  <a:schemeClr val="dk1"/>
+                </a:lnRef>
+                <a:fillRef idx="1">
+                  <a:schemeClr val="lt1"/>
+                </a:fillRef>
+                <a:effectRef idx="0">
+                  <a:schemeClr val="dk1"/>
+                </a:effectRef>
+                <a:fontRef idx="minor">
+                  <a:schemeClr val="dk1"/>
+                </a:fontRef>
+              </p:style>
+              <p:txBody>
+                <a:bodyPr rtlCol="0" anchor="ctr"/>
+                <a:lstStyle/>
+                <a:p>
+                  <a:pPr algn="ctr"/>
+                  <a:endParaRPr lang="en-US" dirty="0"/>
+                </a:p>
+              </p:txBody>
+            </p:sp>
+            <p:cxnSp>
+              <p:nvCxnSpPr>
+                <p:cNvPr id="32" name="Straight Connector 31"/>
+                <p:cNvCxnSpPr/>
+                <p:nvPr/>
+              </p:nvCxnSpPr>
+              <p:spPr>
+                <a:xfrm>
+                  <a:off x="6037897" y="657224"/>
+                  <a:ext cx="0" cy="2743200"/>
+                </a:xfrm>
+                <a:prstGeom prst="line">
+                  <a:avLst/>
+                </a:prstGeom>
+                <a:ln w="19050"/>
+              </p:spPr>
+              <p:style>
+                <a:lnRef idx="3">
+                  <a:schemeClr val="dk1"/>
+                </a:lnRef>
+                <a:fillRef idx="0">
+                  <a:schemeClr val="dk1"/>
+                </a:fillRef>
+                <a:effectRef idx="2">
+                  <a:schemeClr val="dk1"/>
+                </a:effectRef>
+                <a:fontRef idx="minor">
+                  <a:schemeClr val="tx1"/>
+                </a:fontRef>
+              </p:style>
+            </p:cxnSp>
+            <p:cxnSp>
+              <p:nvCxnSpPr>
+                <p:cNvPr id="33" name="Straight Connector 32"/>
+                <p:cNvCxnSpPr>
+                  <a:endCxn id="30" idx="2"/>
+                </p:cNvCxnSpPr>
+                <p:nvPr/>
+              </p:nvCxnSpPr>
+              <p:spPr>
+                <a:xfrm flipH="1">
+                  <a:off x="4272028" y="3400424"/>
+                  <a:ext cx="1765869" cy="2743186"/>
+                </a:xfrm>
+                <a:prstGeom prst="line">
+                  <a:avLst/>
+                </a:prstGeom>
+                <a:ln w="19050"/>
+              </p:spPr>
+              <p:style>
+                <a:lnRef idx="3">
+                  <a:schemeClr val="dk1"/>
+                </a:lnRef>
+                <a:fillRef idx="0">
+                  <a:schemeClr val="dk1"/>
+                </a:fillRef>
+                <a:effectRef idx="2">
+                  <a:schemeClr val="dk1"/>
+                </a:effectRef>
+                <a:fontRef idx="minor">
+                  <a:schemeClr val="tx1"/>
+                </a:fontRef>
+              </p:style>
+            </p:cxnSp>
+            <p:cxnSp>
+              <p:nvCxnSpPr>
+                <p:cNvPr id="37" name="Straight Connector 36"/>
+                <p:cNvCxnSpPr>
+                  <a:endCxn id="30" idx="4"/>
+                </p:cNvCxnSpPr>
+                <p:nvPr/>
+              </p:nvCxnSpPr>
+              <p:spPr>
+                <a:xfrm>
+                  <a:off x="6037897" y="3400410"/>
+                  <a:ext cx="1794445" cy="2743200"/>
+                </a:xfrm>
+                <a:prstGeom prst="line">
+                  <a:avLst/>
+                </a:prstGeom>
+                <a:ln w="19050"/>
+              </p:spPr>
+              <p:style>
+                <a:lnRef idx="3">
+                  <a:schemeClr val="dk1"/>
+                </a:lnRef>
+                <a:fillRef idx="0">
+                  <a:schemeClr val="dk1"/>
+                </a:fillRef>
+                <a:effectRef idx="2">
+                  <a:schemeClr val="dk1"/>
+                </a:effectRef>
+                <a:fontRef idx="minor">
+                  <a:schemeClr val="tx1"/>
+                </a:fontRef>
+              </p:style>
+            </p:cxnSp>
+            <p:cxnSp>
+              <p:nvCxnSpPr>
+                <p:cNvPr id="40" name="Straight Connector 39"/>
+                <p:cNvCxnSpPr>
+                  <a:endCxn id="30" idx="1"/>
+                </p:cNvCxnSpPr>
+                <p:nvPr/>
+              </p:nvCxnSpPr>
+              <p:spPr>
+                <a:xfrm flipH="1" flipV="1">
+                  <a:off x="3171831" y="2752837"/>
+                  <a:ext cx="2880354" cy="647559"/>
+                </a:xfrm>
+                <a:prstGeom prst="line">
+                  <a:avLst/>
+                </a:prstGeom>
+                <a:ln w="19050"/>
+              </p:spPr>
+              <p:style>
+                <a:lnRef idx="3">
+                  <a:schemeClr val="dk1"/>
+                </a:lnRef>
+                <a:fillRef idx="0">
+                  <a:schemeClr val="dk1"/>
+                </a:fillRef>
+                <a:effectRef idx="2">
+                  <a:schemeClr val="dk1"/>
+                </a:effectRef>
+                <a:fontRef idx="minor">
+                  <a:schemeClr val="tx1"/>
+                </a:fontRef>
+              </p:style>
+            </p:cxnSp>
+            <p:cxnSp>
+              <p:nvCxnSpPr>
+                <p:cNvPr id="43" name="Straight Connector 42"/>
+                <p:cNvCxnSpPr>
+                  <a:stCxn id="30" idx="5"/>
+                </p:cNvCxnSpPr>
+                <p:nvPr/>
+              </p:nvCxnSpPr>
+              <p:spPr>
+                <a:xfrm flipH="1">
+                  <a:off x="6023611" y="2752837"/>
+                  <a:ext cx="2908928" cy="647559"/>
+                </a:xfrm>
+                <a:prstGeom prst="line">
+                  <a:avLst/>
+                </a:prstGeom>
+                <a:ln w="19050"/>
+              </p:spPr>
+              <p:style>
+                <a:lnRef idx="3">
+                  <a:schemeClr val="dk1"/>
+                </a:lnRef>
+                <a:fillRef idx="0">
+                  <a:schemeClr val="dk1"/>
+                </a:fillRef>
+                <a:effectRef idx="2">
+                  <a:schemeClr val="dk1"/>
+                </a:effectRef>
+                <a:fontRef idx="minor">
+                  <a:schemeClr val="tx1"/>
+                </a:fontRef>
+              </p:style>
+            </p:cxnSp>
+          </p:grpSp>
+          <p:grpSp>
+            <p:nvGrpSpPr>
+              <p:cNvPr id="54" name="Group 53"/>
+              <p:cNvGrpSpPr/>
+              <p:nvPr/>
+            </p:nvGrpSpPr>
+            <p:grpSpPr>
+              <a:xfrm>
+                <a:off x="3635286" y="1123431"/>
+                <a:ext cx="4800600" cy="4572000"/>
+                <a:chOff x="3635286" y="1123431"/>
+                <a:chExt cx="4800600" cy="4572000"/>
+              </a:xfrm>
+            </p:grpSpPr>
+            <p:sp>
+              <p:nvSpPr>
+                <p:cNvPr id="49" name="Regular Pentagon 48"/>
+                <p:cNvSpPr>
+                  <a:spLocks noChangeAspect="1"/>
+                </p:cNvSpPr>
+                <p:nvPr/>
+              </p:nvSpPr>
+              <p:spPr>
+                <a:xfrm>
+                  <a:off x="3635286" y="1123431"/>
+                  <a:ext cx="4800600" cy="4572000"/>
+                </a:xfrm>
+                <a:prstGeom prst="pentagon">
+                  <a:avLst/>
+                </a:prstGeom>
+                <a:noFill/>
+                <a:ln w="12700">
+                  <a:solidFill>
+                    <a:schemeClr val="bg1">
+                      <a:lumMod val="65000"/>
+                    </a:schemeClr>
+                  </a:solidFill>
+                  <a:prstDash val="dash"/>
+                </a:ln>
+              </p:spPr>
+              <p:style>
+                <a:lnRef idx="2">
+                  <a:schemeClr val="dk1"/>
+                </a:lnRef>
+                <a:fillRef idx="1">
+                  <a:schemeClr val="lt1"/>
+                </a:fillRef>
+                <a:effectRef idx="0">
+                  <a:schemeClr val="dk1"/>
+                </a:effectRef>
+                <a:fontRef idx="minor">
+                  <a:schemeClr val="dk1"/>
+                </a:fontRef>
+              </p:style>
+              <p:txBody>
+                <a:bodyPr rtlCol="0" anchor="ctr"/>
+                <a:lstStyle/>
+                <a:p>
+                  <a:pPr algn="ctr"/>
+                  <a:endParaRPr lang="en-US" dirty="0"/>
+                </a:p>
+              </p:txBody>
+            </p:sp>
+            <p:sp>
+              <p:nvSpPr>
+                <p:cNvPr id="50" name="Regular Pentagon 49"/>
+                <p:cNvSpPr>
+                  <a:spLocks noChangeAspect="1"/>
+                </p:cNvSpPr>
+                <p:nvPr/>
+              </p:nvSpPr>
+              <p:spPr>
+                <a:xfrm>
+                  <a:off x="4117653" y="1545963"/>
+                  <a:ext cx="3840480" cy="3657600"/>
+                </a:xfrm>
+                <a:prstGeom prst="pentagon">
+                  <a:avLst/>
+                </a:prstGeom>
+                <a:noFill/>
+                <a:ln w="12700">
+                  <a:solidFill>
+                    <a:schemeClr val="bg1">
+                      <a:lumMod val="65000"/>
+                    </a:schemeClr>
+                  </a:solidFill>
+                  <a:prstDash val="dash"/>
+                </a:ln>
+              </p:spPr>
+              <p:style>
+                <a:lnRef idx="2">
+                  <a:schemeClr val="dk1"/>
+                </a:lnRef>
+                <a:fillRef idx="1">
+                  <a:schemeClr val="lt1"/>
+                </a:fillRef>
+                <a:effectRef idx="0">
+                  <a:schemeClr val="dk1"/>
+                </a:effectRef>
+                <a:fontRef idx="minor">
+                  <a:schemeClr val="dk1"/>
+                </a:fontRef>
+              </p:style>
+              <p:txBody>
+                <a:bodyPr rtlCol="0" anchor="ctr"/>
+                <a:lstStyle/>
+                <a:p>
+                  <a:pPr algn="ctr"/>
+                  <a:endParaRPr lang="en-US" dirty="0"/>
+                </a:p>
+              </p:txBody>
+            </p:sp>
+            <p:sp>
+              <p:nvSpPr>
+                <p:cNvPr id="51" name="Regular Pentagon 50"/>
+                <p:cNvSpPr>
+                  <a:spLocks noChangeAspect="1"/>
+                </p:cNvSpPr>
+                <p:nvPr/>
+              </p:nvSpPr>
+              <p:spPr>
+                <a:xfrm>
+                  <a:off x="4614937" y="2027191"/>
+                  <a:ext cx="2880360" cy="2743200"/>
+                </a:xfrm>
+                <a:prstGeom prst="pentagon">
+                  <a:avLst/>
+                </a:prstGeom>
+                <a:noFill/>
+                <a:ln w="12700">
+                  <a:solidFill>
+                    <a:schemeClr val="bg1">
+                      <a:lumMod val="65000"/>
+                    </a:schemeClr>
+                  </a:solidFill>
+                  <a:prstDash val="dash"/>
+                </a:ln>
+              </p:spPr>
+              <p:style>
+                <a:lnRef idx="2">
+                  <a:schemeClr val="dk1"/>
+                </a:lnRef>
+                <a:fillRef idx="1">
+                  <a:schemeClr val="lt1"/>
+                </a:fillRef>
+                <a:effectRef idx="0">
+                  <a:schemeClr val="dk1"/>
+                </a:effectRef>
+                <a:fontRef idx="minor">
+                  <a:schemeClr val="dk1"/>
+                </a:fontRef>
+              </p:style>
+              <p:txBody>
+                <a:bodyPr rtlCol="0" anchor="ctr"/>
+                <a:lstStyle/>
+                <a:p>
+                  <a:pPr algn="ctr"/>
+                  <a:endParaRPr lang="en-US" dirty="0"/>
+                </a:p>
+              </p:txBody>
+            </p:sp>
+            <p:sp>
+              <p:nvSpPr>
+                <p:cNvPr id="52" name="Regular Pentagon 51"/>
+                <p:cNvSpPr>
+                  <a:spLocks noChangeAspect="1"/>
+                </p:cNvSpPr>
+                <p:nvPr/>
+              </p:nvSpPr>
+              <p:spPr>
+                <a:xfrm>
+                  <a:off x="5078451" y="2486033"/>
+                  <a:ext cx="1920240" cy="1828800"/>
+                </a:xfrm>
+                <a:prstGeom prst="pentagon">
+                  <a:avLst/>
+                </a:prstGeom>
+                <a:noFill/>
+                <a:ln w="12700">
+                  <a:solidFill>
+                    <a:schemeClr val="bg1">
+                      <a:lumMod val="65000"/>
+                    </a:schemeClr>
+                  </a:solidFill>
+                  <a:prstDash val="dash"/>
+                </a:ln>
+              </p:spPr>
+              <p:style>
+                <a:lnRef idx="2">
+                  <a:schemeClr val="dk1"/>
+                </a:lnRef>
+                <a:fillRef idx="1">
+                  <a:schemeClr val="lt1"/>
+                </a:fillRef>
+                <a:effectRef idx="0">
+                  <a:schemeClr val="dk1"/>
+                </a:effectRef>
+                <a:fontRef idx="minor">
+                  <a:schemeClr val="dk1"/>
+                </a:fontRef>
+              </p:style>
+              <p:txBody>
+                <a:bodyPr rtlCol="0" anchor="ctr"/>
+                <a:lstStyle/>
+                <a:p>
+                  <a:pPr algn="ctr"/>
+                  <a:endParaRPr lang="en-US" dirty="0"/>
+                </a:p>
+              </p:txBody>
+            </p:sp>
+            <p:sp>
+              <p:nvSpPr>
+                <p:cNvPr id="53" name="Regular Pentagon 52"/>
+                <p:cNvSpPr>
+                  <a:spLocks noChangeAspect="1"/>
+                </p:cNvSpPr>
+                <p:nvPr/>
+              </p:nvSpPr>
+              <p:spPr>
+                <a:xfrm>
+                  <a:off x="5566761" y="2928943"/>
+                  <a:ext cx="960120" cy="914400"/>
+                </a:xfrm>
+                <a:prstGeom prst="pentagon">
+                  <a:avLst/>
+                </a:prstGeom>
+                <a:noFill/>
+                <a:ln w="12700">
+                  <a:solidFill>
+                    <a:schemeClr val="bg1">
+                      <a:lumMod val="65000"/>
+                    </a:schemeClr>
+                  </a:solidFill>
+                  <a:prstDash val="dash"/>
+                </a:ln>
+              </p:spPr>
+              <p:style>
+                <a:lnRef idx="2">
+                  <a:schemeClr val="dk1"/>
+                </a:lnRef>
+                <a:fillRef idx="1">
+                  <a:schemeClr val="lt1"/>
+                </a:fillRef>
+                <a:effectRef idx="0">
+                  <a:schemeClr val="dk1"/>
+                </a:effectRef>
+                <a:fontRef idx="minor">
+                  <a:schemeClr val="dk1"/>
+                </a:fontRef>
+              </p:style>
+              <p:txBody>
+                <a:bodyPr rtlCol="0" anchor="ctr"/>
+                <a:lstStyle/>
+                <a:p>
+                  <a:pPr algn="ctr"/>
+                  <a:endParaRPr lang="en-US" dirty="0"/>
+                </a:p>
+              </p:txBody>
+            </p:sp>
+          </p:grpSp>
         </p:grpSp>
         <p:sp>
           <p:nvSpPr>
-            <p:cNvPr id="93" name="Rectangle 92"/>
-            <p:cNvSpPr/>
+            <p:cNvPr id="55" name="TextBox 54"/>
+            <p:cNvSpPr txBox="1"/>
             <p:nvPr/>
           </p:nvSpPr>
           <p:spPr>
-            <a:xfrm>
-              <a:off x="2161082" y="279824"/>
-              <a:ext cx="447558" cy="369332"/>
+            <a:xfrm rot="2181164">
+              <a:off x="5974112" y="2797212"/>
+              <a:ext cx="559512" cy="276999"/>
             </a:xfrm>
             <a:prstGeom prst="rect">
               <a:avLst/>
             </a:prstGeom>
-            <a:ln>
-              <a:solidFill>
-                <a:schemeClr val="tx1"/>
-              </a:solidFill>
-            </a:ln>
+            <a:noFill/>
           </p:spPr>
           <p:txBody>
-            <a:bodyPr wrap="none">
+            <a:bodyPr wrap="none" rtlCol="0">
               <a:spAutoFit/>
             </a:bodyPr>
             <a:lstStyle/>
             <a:p>
               <a:r>
-                <a:rPr lang="en-US" b="1" dirty="0">
-                  <a:effectLst/>
-                  <a:latin typeface="Calibri" charset="0"/>
-                  <a:ea typeface="Calibri" charset="0"/>
-                  <a:cs typeface="Times New Roman" charset="0"/>
-                </a:rPr>
-                <a:t>D1</a:t>
+                <a:rPr lang="en-US" sz="1200" dirty="0" err="1"/>
+                <a:t>Adota</a:t>
+              </a:r>
+              <a:endParaRPr lang="en-US" sz="1200" dirty="0"/>
+            </a:p>
+          </p:txBody>
+        </p:sp>
+        <p:sp>
+          <p:nvSpPr>
+            <p:cNvPr id="57" name="TextBox 56"/>
+            <p:cNvSpPr txBox="1"/>
+            <p:nvPr/>
+          </p:nvSpPr>
+          <p:spPr>
+            <a:xfrm rot="2165657">
+              <a:off x="5951855" y="2447108"/>
+              <a:ext cx="855362" cy="276999"/>
+            </a:xfrm>
+            <a:prstGeom prst="rect">
+              <a:avLst/>
+            </a:prstGeom>
+            <a:noFill/>
+          </p:spPr>
+          <p:txBody>
+            <a:bodyPr wrap="none" rtlCol="0">
+              <a:spAutoFit/>
+            </a:bodyPr>
+            <a:lstStyle/>
+            <a:p>
+              <a:r>
+                <a:rPr lang="en-US" sz="1200" dirty="0" err="1"/>
+                <a:t>Especializa</a:t>
+              </a:r>
+              <a:endParaRPr lang="en-US" sz="1200" dirty="0"/>
+            </a:p>
+          </p:txBody>
+        </p:sp>
+        <p:sp>
+          <p:nvSpPr>
+            <p:cNvPr id="58" name="TextBox 57"/>
+            <p:cNvSpPr txBox="1"/>
+            <p:nvPr/>
+          </p:nvSpPr>
+          <p:spPr>
+            <a:xfrm rot="2191087">
+              <a:off x="5965194" y="1939634"/>
+              <a:ext cx="827406" cy="276999"/>
+            </a:xfrm>
+            <a:prstGeom prst="rect">
+              <a:avLst/>
+            </a:prstGeom>
+            <a:noFill/>
+          </p:spPr>
+          <p:txBody>
+            <a:bodyPr wrap="none" rtlCol="0">
+              <a:spAutoFit/>
+            </a:bodyPr>
+            <a:lstStyle/>
+            <a:p>
+              <a:r>
+                <a:rPr lang="en-US" sz="1200" dirty="0" err="1"/>
+                <a:t>Evangeliza</a:t>
+              </a:r>
+              <a:endParaRPr lang="en-US" sz="1200" dirty="0"/>
+            </a:p>
+          </p:txBody>
+        </p:sp>
+        <p:sp>
+          <p:nvSpPr>
+            <p:cNvPr id="59" name="TextBox 58"/>
+            <p:cNvSpPr txBox="1"/>
+            <p:nvPr/>
+          </p:nvSpPr>
+          <p:spPr>
+            <a:xfrm rot="2078593">
+              <a:off x="5945831" y="1478155"/>
+              <a:ext cx="795859" cy="276999"/>
+            </a:xfrm>
+            <a:prstGeom prst="rect">
+              <a:avLst/>
+            </a:prstGeom>
+            <a:noFill/>
+          </p:spPr>
+          <p:txBody>
+            <a:bodyPr wrap="none" rtlCol="0">
+              <a:spAutoFit/>
+            </a:bodyPr>
+            <a:lstStyle/>
+            <a:p>
+              <a:r>
+                <a:rPr lang="en-US" sz="1200" dirty="0" err="1"/>
+                <a:t>Masteriza</a:t>
+              </a:r>
+              <a:endParaRPr lang="en-US" sz="1200" dirty="0"/>
+            </a:p>
+          </p:txBody>
+        </p:sp>
+        <p:sp>
+          <p:nvSpPr>
+            <p:cNvPr id="60" name="TextBox 59"/>
+            <p:cNvSpPr txBox="1"/>
+            <p:nvPr/>
+          </p:nvSpPr>
+          <p:spPr>
+            <a:xfrm rot="2052088">
+              <a:off x="5996437" y="1049004"/>
+              <a:ext cx="428322" cy="276999"/>
+            </a:xfrm>
+            <a:prstGeom prst="rect">
+              <a:avLst/>
+            </a:prstGeom>
+            <a:noFill/>
+          </p:spPr>
+          <p:txBody>
+            <a:bodyPr wrap="none" rtlCol="0">
+              <a:spAutoFit/>
+            </a:bodyPr>
+            <a:lstStyle/>
+            <a:p>
+              <a:r>
+                <a:rPr lang="en-US" sz="1200" dirty="0" err="1"/>
+                <a:t>Cria</a:t>
+              </a:r>
+              <a:endParaRPr lang="en-US" sz="1200" dirty="0"/>
+            </a:p>
+          </p:txBody>
+        </p:sp>
+        <p:sp>
+          <p:nvSpPr>
+            <p:cNvPr id="61" name="TextBox 60"/>
+            <p:cNvSpPr txBox="1"/>
+            <p:nvPr/>
+          </p:nvSpPr>
+          <p:spPr>
+            <a:xfrm>
+              <a:off x="5433536" y="282434"/>
+              <a:ext cx="1180451" cy="369332"/>
+            </a:xfrm>
+            <a:prstGeom prst="rect">
+              <a:avLst/>
+            </a:prstGeom>
+            <a:noFill/>
+          </p:spPr>
+          <p:txBody>
+            <a:bodyPr wrap="none" rtlCol="0">
+              <a:spAutoFit/>
+            </a:bodyPr>
+            <a:lstStyle/>
+            <a:p>
+              <a:r>
+                <a:rPr lang="pt-BR" dirty="0"/>
+                <a:t>Tecnologia</a:t>
+              </a:r>
+            </a:p>
+          </p:txBody>
+        </p:sp>
+        <p:sp>
+          <p:nvSpPr>
+            <p:cNvPr id="62" name="TextBox 61"/>
+            <p:cNvSpPr txBox="1"/>
+            <p:nvPr/>
+          </p:nvSpPr>
+          <p:spPr>
+            <a:xfrm rot="17228096">
+              <a:off x="6128367" y="3459706"/>
+              <a:ext cx="713722" cy="276999"/>
+            </a:xfrm>
+            <a:prstGeom prst="rect">
+              <a:avLst/>
+            </a:prstGeom>
+            <a:noFill/>
+          </p:spPr>
+          <p:txBody>
+            <a:bodyPr wrap="none" rtlCol="0">
+              <a:spAutoFit/>
+            </a:bodyPr>
+            <a:lstStyle/>
+            <a:p>
+              <a:r>
+                <a:rPr lang="en-US" sz="1200" dirty="0" err="1"/>
+                <a:t>Melhora</a:t>
+              </a:r>
+              <a:endParaRPr lang="en-US" sz="1200" dirty="0"/>
+            </a:p>
+          </p:txBody>
+        </p:sp>
+        <p:sp>
+          <p:nvSpPr>
+            <p:cNvPr id="64" name="TextBox 63"/>
+            <p:cNvSpPr txBox="1"/>
+            <p:nvPr/>
+          </p:nvSpPr>
+          <p:spPr>
+            <a:xfrm rot="16901992">
+              <a:off x="6679841" y="3293057"/>
+              <a:ext cx="633122" cy="276999"/>
+            </a:xfrm>
+            <a:prstGeom prst="rect">
+              <a:avLst/>
+            </a:prstGeom>
+            <a:noFill/>
+          </p:spPr>
+          <p:txBody>
+            <a:bodyPr wrap="none" rtlCol="0">
+              <a:spAutoFit/>
+            </a:bodyPr>
+            <a:lstStyle/>
+            <a:p>
+              <a:r>
+                <a:rPr lang="en-US" sz="1200" dirty="0" err="1"/>
+                <a:t>Projeta</a:t>
+              </a:r>
+              <a:endParaRPr lang="en-US" sz="1200" dirty="0"/>
+            </a:p>
+          </p:txBody>
+        </p:sp>
+        <p:sp>
+          <p:nvSpPr>
+            <p:cNvPr id="65" name="TextBox 64"/>
+            <p:cNvSpPr txBox="1"/>
+            <p:nvPr/>
+          </p:nvSpPr>
+          <p:spPr>
+            <a:xfrm rot="17128731">
+              <a:off x="7176647" y="3212065"/>
+              <a:ext cx="673582" cy="276999"/>
+            </a:xfrm>
+            <a:prstGeom prst="rect">
+              <a:avLst/>
+            </a:prstGeom>
+            <a:noFill/>
+          </p:spPr>
+          <p:txBody>
+            <a:bodyPr wrap="none" rtlCol="0">
+              <a:spAutoFit/>
+            </a:bodyPr>
+            <a:lstStyle/>
+            <a:p>
+              <a:r>
+                <a:rPr lang="en-US" sz="1200" dirty="0" err="1"/>
+                <a:t>Domina</a:t>
+              </a:r>
+              <a:endParaRPr lang="en-US" sz="1200" dirty="0"/>
+            </a:p>
+          </p:txBody>
+        </p:sp>
+        <p:sp>
+          <p:nvSpPr>
+            <p:cNvPr id="66" name="TextBox 65"/>
+            <p:cNvSpPr txBox="1"/>
+            <p:nvPr/>
+          </p:nvSpPr>
+          <p:spPr>
+            <a:xfrm rot="17205988">
+              <a:off x="7696404" y="3048843"/>
+              <a:ext cx="556371" cy="276999"/>
+            </a:xfrm>
+            <a:prstGeom prst="rect">
+              <a:avLst/>
+            </a:prstGeom>
+            <a:noFill/>
+          </p:spPr>
+          <p:txBody>
+            <a:bodyPr wrap="none" rtlCol="0">
+              <a:spAutoFit/>
+            </a:bodyPr>
+            <a:lstStyle/>
+            <a:p>
+              <a:r>
+                <a:rPr lang="en-US" sz="1200" dirty="0" err="1"/>
+                <a:t>Evolui</a:t>
+              </a:r>
+              <a:endParaRPr lang="en-US" sz="1200" dirty="0"/>
+            </a:p>
+          </p:txBody>
+        </p:sp>
+        <p:sp>
+          <p:nvSpPr>
+            <p:cNvPr id="67" name="TextBox 66"/>
+            <p:cNvSpPr txBox="1"/>
+            <p:nvPr/>
+          </p:nvSpPr>
+          <p:spPr>
+            <a:xfrm rot="17314599">
+              <a:off x="8173618" y="2923619"/>
+              <a:ext cx="564642" cy="276999"/>
+            </a:xfrm>
+            <a:prstGeom prst="rect">
+              <a:avLst/>
+            </a:prstGeom>
+            <a:noFill/>
+          </p:spPr>
+          <p:txBody>
+            <a:bodyPr wrap="none" rtlCol="0">
+              <a:spAutoFit/>
+            </a:bodyPr>
+            <a:lstStyle/>
+            <a:p>
+              <a:r>
+                <a:rPr lang="en-US" sz="1200" dirty="0" err="1"/>
+                <a:t>Lidera</a:t>
+              </a:r>
+              <a:endParaRPr lang="en-US" sz="1200" dirty="0"/>
+            </a:p>
+          </p:txBody>
+        </p:sp>
+        <p:sp>
+          <p:nvSpPr>
+            <p:cNvPr id="68" name="TextBox 67"/>
+            <p:cNvSpPr txBox="1"/>
+            <p:nvPr/>
+          </p:nvSpPr>
+          <p:spPr>
+            <a:xfrm>
+              <a:off x="8913638" y="2544572"/>
+              <a:ext cx="915379" cy="369332"/>
+            </a:xfrm>
+            <a:prstGeom prst="rect">
+              <a:avLst/>
+            </a:prstGeom>
+            <a:noFill/>
+          </p:spPr>
+          <p:txBody>
+            <a:bodyPr wrap="none" rtlCol="0">
+              <a:spAutoFit/>
+            </a:bodyPr>
+            <a:lstStyle/>
+            <a:p>
+              <a:r>
+                <a:rPr lang="en-US" dirty="0"/>
+                <a:t>Sistema</a:t>
+              </a:r>
+            </a:p>
+          </p:txBody>
+        </p:sp>
+        <p:sp>
+          <p:nvSpPr>
+            <p:cNvPr id="69" name="TextBox 68"/>
+            <p:cNvSpPr txBox="1"/>
+            <p:nvPr/>
+          </p:nvSpPr>
+          <p:spPr>
+            <a:xfrm rot="19458038">
+              <a:off x="5361351" y="2916243"/>
+              <a:ext cx="673389" cy="276999"/>
+            </a:xfrm>
+            <a:prstGeom prst="rect">
+              <a:avLst/>
+            </a:prstGeom>
+            <a:noFill/>
+          </p:spPr>
+          <p:txBody>
+            <a:bodyPr wrap="none" rtlCol="0">
+              <a:spAutoFit/>
+            </a:bodyPr>
+            <a:lstStyle/>
+            <a:p>
+              <a:r>
+                <a:rPr lang="en-US" sz="1200" dirty="0"/>
+                <a:t>Sistema</a:t>
+              </a:r>
+            </a:p>
+          </p:txBody>
+        </p:sp>
+        <p:sp>
+          <p:nvSpPr>
+            <p:cNvPr id="70" name="TextBox 69"/>
+            <p:cNvSpPr txBox="1"/>
+            <p:nvPr/>
+          </p:nvSpPr>
+          <p:spPr>
+            <a:xfrm rot="19435103">
+              <a:off x="4896196" y="2819942"/>
+              <a:ext cx="610424" cy="276999"/>
+            </a:xfrm>
+            <a:prstGeom prst="rect">
+              <a:avLst/>
+            </a:prstGeom>
+            <a:noFill/>
+          </p:spPr>
+          <p:txBody>
+            <a:bodyPr wrap="none" rtlCol="0">
+              <a:spAutoFit/>
+            </a:bodyPr>
+            <a:lstStyle/>
+            <a:p>
+              <a:r>
+                <a:rPr lang="en-US" sz="1200" dirty="0"/>
+                <a:t>Equipe</a:t>
+              </a:r>
+            </a:p>
+          </p:txBody>
+        </p:sp>
+        <p:sp>
+          <p:nvSpPr>
+            <p:cNvPr id="71" name="TextBox 70"/>
+            <p:cNvSpPr txBox="1"/>
+            <p:nvPr/>
+          </p:nvSpPr>
+          <p:spPr>
+            <a:xfrm rot="19390348">
+              <a:off x="4357327" y="2503991"/>
+              <a:ext cx="768159" cy="461665"/>
+            </a:xfrm>
+            <a:prstGeom prst="rect">
+              <a:avLst/>
+            </a:prstGeom>
+            <a:noFill/>
+          </p:spPr>
+          <p:txBody>
+            <a:bodyPr wrap="none" rtlCol="0">
+              <a:spAutoFit/>
+            </a:bodyPr>
+            <a:lstStyle/>
+            <a:p>
+              <a:r>
+                <a:rPr lang="en-US" sz="1200" dirty="0"/>
+                <a:t>Equipes</a:t>
+              </a:r>
+              <a:br>
+                <a:rPr lang="en-US" sz="1200" dirty="0"/>
+              </a:br>
+              <a:r>
+                <a:rPr lang="en-US" sz="1200" dirty="0" err="1"/>
+                <a:t>Múltiplas</a:t>
+              </a:r>
+              <a:endParaRPr lang="en-US" sz="1200" dirty="0"/>
+            </a:p>
+          </p:txBody>
+        </p:sp>
+        <p:sp>
+          <p:nvSpPr>
+            <p:cNvPr id="73" name="TextBox 72"/>
+            <p:cNvSpPr txBox="1"/>
+            <p:nvPr/>
+          </p:nvSpPr>
+          <p:spPr>
+            <a:xfrm rot="19576326">
+              <a:off x="3900758" y="2573895"/>
+              <a:ext cx="726033" cy="276999"/>
+            </a:xfrm>
+            <a:prstGeom prst="rect">
+              <a:avLst/>
+            </a:prstGeom>
+            <a:noFill/>
+          </p:spPr>
+          <p:txBody>
+            <a:bodyPr wrap="none" rtlCol="0">
+              <a:spAutoFit/>
+            </a:bodyPr>
+            <a:lstStyle/>
+            <a:p>
+              <a:r>
+                <a:rPr lang="en-US" sz="1200" dirty="0" err="1"/>
+                <a:t>Empresa</a:t>
+              </a:r>
+              <a:endParaRPr lang="en-US" sz="1200" dirty="0"/>
+            </a:p>
+          </p:txBody>
+        </p:sp>
+        <p:sp>
+          <p:nvSpPr>
+            <p:cNvPr id="74" name="TextBox 73"/>
+            <p:cNvSpPr txBox="1"/>
+            <p:nvPr/>
+          </p:nvSpPr>
+          <p:spPr>
+            <a:xfrm rot="19518351">
+              <a:off x="3435707" y="2406072"/>
+              <a:ext cx="978153" cy="276999"/>
+            </a:xfrm>
+            <a:prstGeom prst="rect">
+              <a:avLst/>
+            </a:prstGeom>
+            <a:noFill/>
+          </p:spPr>
+          <p:txBody>
+            <a:bodyPr wrap="none" rtlCol="0">
+              <a:spAutoFit/>
+            </a:bodyPr>
+            <a:lstStyle/>
+            <a:p>
+              <a:r>
+                <a:rPr lang="en-US" sz="1200" dirty="0" err="1"/>
+                <a:t>Comunidade</a:t>
+              </a:r>
+              <a:endParaRPr lang="en-US" sz="1200" dirty="0"/>
+            </a:p>
+          </p:txBody>
+        </p:sp>
+        <p:sp>
+          <p:nvSpPr>
+            <p:cNvPr id="75" name="TextBox 74"/>
+            <p:cNvSpPr txBox="1"/>
+            <p:nvPr/>
+          </p:nvSpPr>
+          <p:spPr>
+            <a:xfrm>
+              <a:off x="2108011" y="2539804"/>
+              <a:ext cx="1106650" cy="369332"/>
+            </a:xfrm>
+            <a:prstGeom prst="rect">
+              <a:avLst/>
+            </a:prstGeom>
+            <a:noFill/>
+          </p:spPr>
+          <p:txBody>
+            <a:bodyPr wrap="none" rtlCol="0">
+              <a:spAutoFit/>
+            </a:bodyPr>
+            <a:lstStyle/>
+            <a:p>
+              <a:r>
+                <a:rPr lang="pt-BR" dirty="0"/>
+                <a:t>Influência</a:t>
+              </a:r>
+            </a:p>
+          </p:txBody>
+        </p:sp>
+        <p:sp>
+          <p:nvSpPr>
+            <p:cNvPr id="76" name="TextBox 75"/>
+            <p:cNvSpPr txBox="1"/>
+            <p:nvPr/>
+          </p:nvSpPr>
+          <p:spPr>
+            <a:xfrm>
+              <a:off x="7416824" y="6166401"/>
+              <a:ext cx="915828" cy="369332"/>
+            </a:xfrm>
+            <a:prstGeom prst="rect">
+              <a:avLst/>
+            </a:prstGeom>
+            <a:noFill/>
+          </p:spPr>
+          <p:txBody>
+            <a:bodyPr wrap="none" rtlCol="0">
+              <a:spAutoFit/>
+            </a:bodyPr>
+            <a:lstStyle/>
+            <a:p>
+              <a:r>
+                <a:rPr lang="en-US" dirty="0" err="1"/>
+                <a:t>Pessoas</a:t>
               </a:r>
               <a:endParaRPr lang="en-US" dirty="0"/>
             </a:p>
           </p:txBody>
         </p:sp>
-        <p:grpSp>
-          <p:nvGrpSpPr>
-            <p:cNvPr id="184" name="Group 183"/>
-            <p:cNvGrpSpPr/>
+        <p:sp>
+          <p:nvSpPr>
+            <p:cNvPr id="77" name="TextBox 76"/>
+            <p:cNvSpPr txBox="1"/>
             <p:nvPr/>
-          </p:nvGrpSpPr>
-          <p:grpSpPr>
+          </p:nvSpPr>
+          <p:spPr>
             <a:xfrm>
-              <a:off x="2108011" y="282434"/>
-              <a:ext cx="7657079" cy="6253299"/>
-              <a:chOff x="2108011" y="282434"/>
-              <a:chExt cx="7657079" cy="6253299"/>
+              <a:off x="3811595" y="6161638"/>
+              <a:ext cx="1016112" cy="369332"/>
             </a:xfrm>
-          </p:grpSpPr>
-          <p:grpSp>
-            <p:nvGrpSpPr>
-              <p:cNvPr id="185" name="Group 184"/>
-              <p:cNvGrpSpPr/>
-              <p:nvPr/>
-            </p:nvGrpSpPr>
-            <p:grpSpPr>
-              <a:xfrm>
-                <a:off x="3171825" y="657224"/>
-                <a:ext cx="5760720" cy="5486400"/>
-                <a:chOff x="3171825" y="657224"/>
-                <a:chExt cx="5760720" cy="5486400"/>
-              </a:xfrm>
-            </p:grpSpPr>
-            <p:grpSp>
-              <p:nvGrpSpPr>
-                <p:cNvPr id="216" name="Group 215"/>
-                <p:cNvGrpSpPr/>
-                <p:nvPr/>
-              </p:nvGrpSpPr>
-              <p:grpSpPr>
-                <a:xfrm>
-                  <a:off x="3171825" y="657224"/>
-                  <a:ext cx="5760720" cy="5486400"/>
-                  <a:chOff x="3171825" y="657224"/>
-                  <a:chExt cx="5760720" cy="5486400"/>
-                </a:xfrm>
-              </p:grpSpPr>
-              <p:sp>
-                <p:nvSpPr>
-                  <p:cNvPr id="223" name="Regular Pentagon 222"/>
-                  <p:cNvSpPr>
-                    <a:spLocks noChangeAspect="1"/>
-                  </p:cNvSpPr>
-                  <p:nvPr/>
-                </p:nvSpPr>
-                <p:spPr>
-                  <a:xfrm>
-                    <a:off x="3171825" y="657224"/>
-                    <a:ext cx="5760720" cy="5486400"/>
-                  </a:xfrm>
-                  <a:prstGeom prst="pentagon">
-                    <a:avLst/>
-                  </a:prstGeom>
-                  <a:noFill/>
-                  <a:ln w="19050"/>
-                </p:spPr>
-                <p:style>
-                  <a:lnRef idx="2">
-                    <a:schemeClr val="dk1"/>
-                  </a:lnRef>
-                  <a:fillRef idx="1">
-                    <a:schemeClr val="lt1"/>
-                  </a:fillRef>
-                  <a:effectRef idx="0">
-                    <a:schemeClr val="dk1"/>
-                  </a:effectRef>
-                  <a:fontRef idx="minor">
-                    <a:schemeClr val="dk1"/>
-                  </a:fontRef>
-                </p:style>
-                <p:txBody>
-                  <a:bodyPr rtlCol="0" anchor="ctr"/>
-                  <a:lstStyle/>
-                  <a:p>
-                    <a:pPr algn="ctr"/>
-                    <a:endParaRPr lang="en-US"/>
-                  </a:p>
-                </p:txBody>
-              </p:sp>
-              <p:cxnSp>
-                <p:nvCxnSpPr>
-                  <p:cNvPr id="224" name="Straight Connector 223"/>
-                  <p:cNvCxnSpPr/>
-                  <p:nvPr/>
-                </p:nvCxnSpPr>
-                <p:spPr>
-                  <a:xfrm>
-                    <a:off x="6037897" y="657224"/>
-                    <a:ext cx="0" cy="2743200"/>
-                  </a:xfrm>
-                  <a:prstGeom prst="line">
-                    <a:avLst/>
-                  </a:prstGeom>
-                  <a:ln w="19050"/>
-                </p:spPr>
-                <p:style>
-                  <a:lnRef idx="3">
-                    <a:schemeClr val="dk1"/>
-                  </a:lnRef>
-                  <a:fillRef idx="0">
-                    <a:schemeClr val="dk1"/>
-                  </a:fillRef>
-                  <a:effectRef idx="2">
-                    <a:schemeClr val="dk1"/>
-                  </a:effectRef>
-                  <a:fontRef idx="minor">
-                    <a:schemeClr val="tx1"/>
-                  </a:fontRef>
-                </p:style>
-              </p:cxnSp>
-              <p:cxnSp>
-                <p:nvCxnSpPr>
-                  <p:cNvPr id="225" name="Straight Connector 224"/>
-                  <p:cNvCxnSpPr>
-                    <a:endCxn id="212" idx="2"/>
-                  </p:cNvCxnSpPr>
-                  <p:nvPr/>
-                </p:nvCxnSpPr>
-                <p:spPr>
-                  <a:xfrm flipH="1">
-                    <a:off x="4272028" y="3400424"/>
-                    <a:ext cx="1765869" cy="2743186"/>
-                  </a:xfrm>
-                  <a:prstGeom prst="line">
-                    <a:avLst/>
-                  </a:prstGeom>
-                  <a:ln w="19050"/>
-                </p:spPr>
-                <p:style>
-                  <a:lnRef idx="3">
-                    <a:schemeClr val="dk1"/>
-                  </a:lnRef>
-                  <a:fillRef idx="0">
-                    <a:schemeClr val="dk1"/>
-                  </a:fillRef>
-                  <a:effectRef idx="2">
-                    <a:schemeClr val="dk1"/>
-                  </a:effectRef>
-                  <a:fontRef idx="minor">
-                    <a:schemeClr val="tx1"/>
-                  </a:fontRef>
-                </p:style>
-              </p:cxnSp>
-              <p:cxnSp>
-                <p:nvCxnSpPr>
-                  <p:cNvPr id="226" name="Straight Connector 225"/>
-                  <p:cNvCxnSpPr>
-                    <a:endCxn id="212" idx="4"/>
-                  </p:cNvCxnSpPr>
-                  <p:nvPr/>
-                </p:nvCxnSpPr>
-                <p:spPr>
-                  <a:xfrm>
-                    <a:off x="6037897" y="3400410"/>
-                    <a:ext cx="1794445" cy="2743200"/>
-                  </a:xfrm>
-                  <a:prstGeom prst="line">
-                    <a:avLst/>
-                  </a:prstGeom>
-                  <a:ln w="19050"/>
-                </p:spPr>
-                <p:style>
-                  <a:lnRef idx="3">
-                    <a:schemeClr val="dk1"/>
-                  </a:lnRef>
-                  <a:fillRef idx="0">
-                    <a:schemeClr val="dk1"/>
-                  </a:fillRef>
-                  <a:effectRef idx="2">
-                    <a:schemeClr val="dk1"/>
-                  </a:effectRef>
-                  <a:fontRef idx="minor">
-                    <a:schemeClr val="tx1"/>
-                  </a:fontRef>
-                </p:style>
-              </p:cxnSp>
-              <p:cxnSp>
-                <p:nvCxnSpPr>
-                  <p:cNvPr id="227" name="Straight Connector 226"/>
-                  <p:cNvCxnSpPr>
-                    <a:endCxn id="212" idx="1"/>
-                  </p:cNvCxnSpPr>
-                  <p:nvPr/>
-                </p:nvCxnSpPr>
-                <p:spPr>
-                  <a:xfrm flipH="1" flipV="1">
-                    <a:off x="3171831" y="2752837"/>
-                    <a:ext cx="2880354" cy="647559"/>
-                  </a:xfrm>
-                  <a:prstGeom prst="line">
-                    <a:avLst/>
-                  </a:prstGeom>
-                  <a:ln w="19050"/>
-                </p:spPr>
-                <p:style>
-                  <a:lnRef idx="3">
-                    <a:schemeClr val="dk1"/>
-                  </a:lnRef>
-                  <a:fillRef idx="0">
-                    <a:schemeClr val="dk1"/>
-                  </a:fillRef>
-                  <a:effectRef idx="2">
-                    <a:schemeClr val="dk1"/>
-                  </a:effectRef>
-                  <a:fontRef idx="minor">
-                    <a:schemeClr val="tx1"/>
-                  </a:fontRef>
-                </p:style>
-              </p:cxnSp>
-              <p:cxnSp>
-                <p:nvCxnSpPr>
-                  <p:cNvPr id="228" name="Straight Connector 227"/>
-                  <p:cNvCxnSpPr>
-                    <a:stCxn id="212" idx="5"/>
-                  </p:cNvCxnSpPr>
-                  <p:nvPr/>
-                </p:nvCxnSpPr>
-                <p:spPr>
-                  <a:xfrm flipH="1">
-                    <a:off x="6023611" y="2752837"/>
-                    <a:ext cx="2908928" cy="647559"/>
-                  </a:xfrm>
-                  <a:prstGeom prst="line">
-                    <a:avLst/>
-                  </a:prstGeom>
-                  <a:ln w="19050"/>
-                </p:spPr>
-                <p:style>
-                  <a:lnRef idx="3">
-                    <a:schemeClr val="dk1"/>
-                  </a:lnRef>
-                  <a:fillRef idx="0">
-                    <a:schemeClr val="dk1"/>
-                  </a:fillRef>
-                  <a:effectRef idx="2">
-                    <a:schemeClr val="dk1"/>
-                  </a:effectRef>
-                  <a:fontRef idx="minor">
-                    <a:schemeClr val="tx1"/>
-                  </a:fontRef>
-                </p:style>
-              </p:cxnSp>
-            </p:grpSp>
-            <p:grpSp>
-              <p:nvGrpSpPr>
-                <p:cNvPr id="217" name="Group 216"/>
-                <p:cNvGrpSpPr/>
-                <p:nvPr/>
-              </p:nvGrpSpPr>
-              <p:grpSpPr>
-                <a:xfrm>
-                  <a:off x="3657243" y="1112014"/>
-                  <a:ext cx="4800600" cy="4572000"/>
-                  <a:chOff x="3657243" y="1112014"/>
-                  <a:chExt cx="4800600" cy="4572000"/>
-                </a:xfrm>
-              </p:grpSpPr>
-              <p:sp>
-                <p:nvSpPr>
-                  <p:cNvPr id="218" name="Regular Pentagon 217"/>
-                  <p:cNvSpPr>
-                    <a:spLocks noChangeAspect="1"/>
-                  </p:cNvSpPr>
-                  <p:nvPr/>
-                </p:nvSpPr>
-                <p:spPr>
-                  <a:xfrm>
-                    <a:off x="3657243" y="1112014"/>
-                    <a:ext cx="4800600" cy="4572000"/>
-                  </a:xfrm>
-                  <a:prstGeom prst="pentagon">
-                    <a:avLst/>
-                  </a:prstGeom>
-                  <a:noFill/>
-                  <a:ln w="12700">
-                    <a:solidFill>
-                      <a:schemeClr val="bg1">
-                        <a:lumMod val="65000"/>
-                      </a:schemeClr>
-                    </a:solidFill>
-                    <a:prstDash val="dash"/>
-                  </a:ln>
-                </p:spPr>
-                <p:style>
-                  <a:lnRef idx="2">
-                    <a:schemeClr val="dk1"/>
-                  </a:lnRef>
-                  <a:fillRef idx="1">
-                    <a:schemeClr val="lt1"/>
-                  </a:fillRef>
-                  <a:effectRef idx="0">
-                    <a:schemeClr val="dk1"/>
-                  </a:effectRef>
-                  <a:fontRef idx="minor">
-                    <a:schemeClr val="dk1"/>
-                  </a:fontRef>
-                </p:style>
-                <p:txBody>
-                  <a:bodyPr rtlCol="0" anchor="ctr"/>
-                  <a:lstStyle/>
-                  <a:p>
-                    <a:pPr algn="ctr"/>
-                    <a:endParaRPr lang="en-US"/>
-                  </a:p>
-                </p:txBody>
-              </p:sp>
-              <p:sp>
-                <p:nvSpPr>
-                  <p:cNvPr id="219" name="Regular Pentagon 218"/>
-                  <p:cNvSpPr>
-                    <a:spLocks noChangeAspect="1"/>
-                  </p:cNvSpPr>
-                  <p:nvPr/>
-                </p:nvSpPr>
-                <p:spPr>
-                  <a:xfrm>
-                    <a:off x="4117653" y="1545963"/>
-                    <a:ext cx="3840480" cy="3657600"/>
-                  </a:xfrm>
-                  <a:prstGeom prst="pentagon">
-                    <a:avLst/>
-                  </a:prstGeom>
-                  <a:noFill/>
-                  <a:ln w="12700">
-                    <a:solidFill>
-                      <a:schemeClr val="bg1">
-                        <a:lumMod val="65000"/>
-                      </a:schemeClr>
-                    </a:solidFill>
-                    <a:prstDash val="dash"/>
-                  </a:ln>
-                </p:spPr>
-                <p:style>
-                  <a:lnRef idx="2">
-                    <a:schemeClr val="dk1"/>
-                  </a:lnRef>
-                  <a:fillRef idx="1">
-                    <a:schemeClr val="lt1"/>
-                  </a:fillRef>
-                  <a:effectRef idx="0">
-                    <a:schemeClr val="dk1"/>
-                  </a:effectRef>
-                  <a:fontRef idx="minor">
-                    <a:schemeClr val="dk1"/>
-                  </a:fontRef>
-                </p:style>
-                <p:txBody>
-                  <a:bodyPr rtlCol="0" anchor="ctr"/>
-                  <a:lstStyle/>
-                  <a:p>
-                    <a:pPr algn="ctr"/>
-                    <a:endParaRPr lang="en-US"/>
-                  </a:p>
-                </p:txBody>
-              </p:sp>
-              <p:sp>
-                <p:nvSpPr>
-                  <p:cNvPr id="220" name="Regular Pentagon 219"/>
-                  <p:cNvSpPr>
-                    <a:spLocks noChangeAspect="1"/>
-                  </p:cNvSpPr>
-                  <p:nvPr/>
-                </p:nvSpPr>
-                <p:spPr>
-                  <a:xfrm>
-                    <a:off x="4614937" y="2027191"/>
-                    <a:ext cx="2880360" cy="2743200"/>
-                  </a:xfrm>
-                  <a:prstGeom prst="pentagon">
-                    <a:avLst/>
-                  </a:prstGeom>
-                  <a:noFill/>
-                  <a:ln w="12700">
-                    <a:solidFill>
-                      <a:schemeClr val="bg1">
-                        <a:lumMod val="65000"/>
-                      </a:schemeClr>
-                    </a:solidFill>
-                    <a:prstDash val="dash"/>
-                  </a:ln>
-                </p:spPr>
-                <p:style>
-                  <a:lnRef idx="2">
-                    <a:schemeClr val="dk1"/>
-                  </a:lnRef>
-                  <a:fillRef idx="1">
-                    <a:schemeClr val="lt1"/>
-                  </a:fillRef>
-                  <a:effectRef idx="0">
-                    <a:schemeClr val="dk1"/>
-                  </a:effectRef>
-                  <a:fontRef idx="minor">
-                    <a:schemeClr val="dk1"/>
-                  </a:fontRef>
-                </p:style>
-                <p:txBody>
-                  <a:bodyPr rtlCol="0" anchor="ctr"/>
-                  <a:lstStyle/>
-                  <a:p>
-                    <a:pPr algn="ctr"/>
-                    <a:endParaRPr lang="en-US"/>
-                  </a:p>
-                </p:txBody>
-              </p:sp>
-              <p:sp>
-                <p:nvSpPr>
-                  <p:cNvPr id="221" name="Regular Pentagon 220"/>
-                  <p:cNvSpPr>
-                    <a:spLocks noChangeAspect="1"/>
-                  </p:cNvSpPr>
-                  <p:nvPr/>
-                </p:nvSpPr>
-                <p:spPr>
-                  <a:xfrm>
-                    <a:off x="5078451" y="2486033"/>
-                    <a:ext cx="1920240" cy="1828800"/>
-                  </a:xfrm>
-                  <a:prstGeom prst="pentagon">
-                    <a:avLst/>
-                  </a:prstGeom>
-                  <a:noFill/>
-                  <a:ln w="12700">
-                    <a:solidFill>
-                      <a:schemeClr val="bg1">
-                        <a:lumMod val="65000"/>
-                      </a:schemeClr>
-                    </a:solidFill>
-                    <a:prstDash val="dash"/>
-                  </a:ln>
-                </p:spPr>
-                <p:style>
-                  <a:lnRef idx="2">
-                    <a:schemeClr val="dk1"/>
-                  </a:lnRef>
-                  <a:fillRef idx="1">
-                    <a:schemeClr val="lt1"/>
-                  </a:fillRef>
-                  <a:effectRef idx="0">
-                    <a:schemeClr val="dk1"/>
-                  </a:effectRef>
-                  <a:fontRef idx="minor">
-                    <a:schemeClr val="dk1"/>
-                  </a:fontRef>
-                </p:style>
-                <p:txBody>
-                  <a:bodyPr rtlCol="0" anchor="ctr"/>
-                  <a:lstStyle/>
-                  <a:p>
-                    <a:pPr algn="ctr"/>
-                    <a:endParaRPr lang="en-US"/>
-                  </a:p>
-                </p:txBody>
-              </p:sp>
-              <p:sp>
-                <p:nvSpPr>
-                  <p:cNvPr id="222" name="Regular Pentagon 221"/>
-                  <p:cNvSpPr>
-                    <a:spLocks noChangeAspect="1"/>
-                  </p:cNvSpPr>
-                  <p:nvPr/>
-                </p:nvSpPr>
-                <p:spPr>
-                  <a:xfrm>
-                    <a:off x="5566761" y="2928943"/>
-                    <a:ext cx="960120" cy="914400"/>
-                  </a:xfrm>
-                  <a:prstGeom prst="pentagon">
-                    <a:avLst/>
-                  </a:prstGeom>
-                  <a:noFill/>
-                  <a:ln w="12700">
-                    <a:solidFill>
-                      <a:schemeClr val="bg1">
-                        <a:lumMod val="65000"/>
-                      </a:schemeClr>
-                    </a:solidFill>
-                    <a:prstDash val="dash"/>
-                  </a:ln>
-                </p:spPr>
-                <p:style>
-                  <a:lnRef idx="2">
-                    <a:schemeClr val="dk1"/>
-                  </a:lnRef>
-                  <a:fillRef idx="1">
-                    <a:schemeClr val="lt1"/>
-                  </a:fillRef>
-                  <a:effectRef idx="0">
-                    <a:schemeClr val="dk1"/>
-                  </a:effectRef>
-                  <a:fontRef idx="minor">
-                    <a:schemeClr val="dk1"/>
-                  </a:fontRef>
-                </p:style>
-                <p:txBody>
-                  <a:bodyPr rtlCol="0" anchor="ctr"/>
-                  <a:lstStyle/>
-                  <a:p>
-                    <a:pPr algn="ctr"/>
-                    <a:endParaRPr lang="en-US"/>
-                  </a:p>
-                </p:txBody>
-              </p:sp>
-            </p:grpSp>
-          </p:grpSp>
-          <p:sp>
-            <p:nvSpPr>
-              <p:cNvPr id="186" name="TextBox 185"/>
-              <p:cNvSpPr txBox="1"/>
-              <p:nvPr/>
-            </p:nvSpPr>
-            <p:spPr>
-              <a:xfrm>
-                <a:off x="6003957" y="2803547"/>
-                <a:ext cx="628057" cy="276999"/>
-              </a:xfrm>
-              <a:prstGeom prst="rect">
-                <a:avLst/>
-              </a:prstGeom>
-              <a:noFill/>
-            </p:spPr>
-            <p:txBody>
-              <a:bodyPr wrap="none" rtlCol="0">
-                <a:spAutoFit/>
-              </a:bodyPr>
-              <a:lstStyle/>
-              <a:p>
-                <a:r>
-                  <a:rPr lang="en-US" sz="1200" dirty="0"/>
-                  <a:t>Adopts</a:t>
-                </a:r>
-              </a:p>
-            </p:txBody>
-          </p:sp>
-          <p:sp>
-            <p:nvSpPr>
-              <p:cNvPr id="187" name="TextBox 186"/>
-              <p:cNvSpPr txBox="1"/>
-              <p:nvPr/>
-            </p:nvSpPr>
-            <p:spPr>
-              <a:xfrm>
-                <a:off x="5999192" y="2341577"/>
-                <a:ext cx="852926" cy="276999"/>
-              </a:xfrm>
-              <a:prstGeom prst="rect">
-                <a:avLst/>
-              </a:prstGeom>
-              <a:noFill/>
-            </p:spPr>
-            <p:txBody>
-              <a:bodyPr wrap="none" rtlCol="0">
-                <a:spAutoFit/>
-              </a:bodyPr>
-              <a:lstStyle/>
-              <a:p>
-                <a:r>
-                  <a:rPr lang="en-US" sz="1200" dirty="0"/>
-                  <a:t>Specializes</a:t>
-                </a:r>
-              </a:p>
-            </p:txBody>
-          </p:sp>
-          <p:sp>
-            <p:nvSpPr>
-              <p:cNvPr id="188" name="TextBox 187"/>
-              <p:cNvSpPr txBox="1"/>
-              <p:nvPr/>
-            </p:nvSpPr>
-            <p:spPr>
-              <a:xfrm>
-                <a:off x="6008712" y="1893895"/>
-                <a:ext cx="890885" cy="276999"/>
-              </a:xfrm>
-              <a:prstGeom prst="rect">
-                <a:avLst/>
-              </a:prstGeom>
-              <a:noFill/>
-            </p:spPr>
-            <p:txBody>
-              <a:bodyPr wrap="none" rtlCol="0">
-                <a:spAutoFit/>
-              </a:bodyPr>
-              <a:lstStyle/>
-              <a:p>
-                <a:r>
-                  <a:rPr lang="en-US" sz="1200" dirty="0"/>
-                  <a:t>Evangelizes</a:t>
-                </a:r>
-              </a:p>
-            </p:txBody>
-          </p:sp>
-          <p:sp>
-            <p:nvSpPr>
-              <p:cNvPr id="189" name="TextBox 188"/>
-              <p:cNvSpPr txBox="1"/>
-              <p:nvPr/>
-            </p:nvSpPr>
-            <p:spPr>
-              <a:xfrm>
-                <a:off x="6003944" y="1417638"/>
-                <a:ext cx="686983" cy="276999"/>
-              </a:xfrm>
-              <a:prstGeom prst="rect">
-                <a:avLst/>
-              </a:prstGeom>
-              <a:noFill/>
-            </p:spPr>
-            <p:txBody>
-              <a:bodyPr wrap="none" rtlCol="0">
-                <a:spAutoFit/>
-              </a:bodyPr>
-              <a:lstStyle/>
-              <a:p>
-                <a:r>
-                  <a:rPr lang="en-US" sz="1200" dirty="0"/>
-                  <a:t>Masters</a:t>
-                </a:r>
-              </a:p>
-            </p:txBody>
-          </p:sp>
-          <p:sp>
-            <p:nvSpPr>
-              <p:cNvPr id="190" name="TextBox 189"/>
-              <p:cNvSpPr txBox="1"/>
-              <p:nvPr/>
-            </p:nvSpPr>
-            <p:spPr>
-              <a:xfrm>
-                <a:off x="5984888" y="969952"/>
-                <a:ext cx="654218" cy="276999"/>
-              </a:xfrm>
-              <a:prstGeom prst="rect">
-                <a:avLst/>
-              </a:prstGeom>
-              <a:noFill/>
-            </p:spPr>
-            <p:txBody>
-              <a:bodyPr wrap="none" rtlCol="0">
-                <a:spAutoFit/>
-              </a:bodyPr>
-              <a:lstStyle/>
-              <a:p>
-                <a:r>
-                  <a:rPr lang="en-US" sz="1200" dirty="0"/>
-                  <a:t>Creates</a:t>
-                </a:r>
-              </a:p>
-            </p:txBody>
-          </p:sp>
-          <p:sp>
-            <p:nvSpPr>
-              <p:cNvPr id="191" name="TextBox 190"/>
-              <p:cNvSpPr txBox="1"/>
-              <p:nvPr/>
-            </p:nvSpPr>
-            <p:spPr>
-              <a:xfrm>
-                <a:off x="5433536" y="282434"/>
-                <a:ext cx="1243161" cy="369332"/>
-              </a:xfrm>
-              <a:prstGeom prst="rect">
-                <a:avLst/>
-              </a:prstGeom>
-              <a:noFill/>
-            </p:spPr>
-            <p:txBody>
-              <a:bodyPr wrap="none" rtlCol="0">
-                <a:spAutoFit/>
-              </a:bodyPr>
-              <a:lstStyle/>
-              <a:p>
-                <a:r>
-                  <a:rPr lang="en-US" dirty="0"/>
-                  <a:t>Technology</a:t>
-                </a:r>
-              </a:p>
-            </p:txBody>
-          </p:sp>
-          <p:sp>
-            <p:nvSpPr>
-              <p:cNvPr id="192" name="TextBox 191"/>
-              <p:cNvSpPr txBox="1"/>
-              <p:nvPr/>
-            </p:nvSpPr>
-            <p:spPr>
-              <a:xfrm>
-                <a:off x="6084917" y="3356006"/>
-                <a:ext cx="777777" cy="276999"/>
-              </a:xfrm>
-              <a:prstGeom prst="rect">
-                <a:avLst/>
-              </a:prstGeom>
-              <a:noFill/>
-            </p:spPr>
-            <p:txBody>
-              <a:bodyPr wrap="none" rtlCol="0">
-                <a:spAutoFit/>
-              </a:bodyPr>
-              <a:lstStyle/>
-              <a:p>
-                <a:r>
-                  <a:rPr lang="en-US" sz="1200" dirty="0"/>
-                  <a:t>Enhances</a:t>
-                </a:r>
-              </a:p>
-            </p:txBody>
-          </p:sp>
-          <p:sp>
-            <p:nvSpPr>
-              <p:cNvPr id="193" name="TextBox 192"/>
-              <p:cNvSpPr txBox="1"/>
-              <p:nvPr/>
-            </p:nvSpPr>
-            <p:spPr>
-              <a:xfrm>
-                <a:off x="6611019" y="3209017"/>
-                <a:ext cx="665567" cy="276999"/>
-              </a:xfrm>
-              <a:prstGeom prst="rect">
-                <a:avLst/>
-              </a:prstGeom>
-              <a:noFill/>
-            </p:spPr>
-            <p:txBody>
-              <a:bodyPr wrap="none" rtlCol="0">
-                <a:spAutoFit/>
-              </a:bodyPr>
-              <a:lstStyle/>
-              <a:p>
-                <a:r>
-                  <a:rPr lang="en-US" sz="1200" dirty="0"/>
-                  <a:t>Designs</a:t>
-                </a:r>
-              </a:p>
-            </p:txBody>
-          </p:sp>
-          <p:sp>
-            <p:nvSpPr>
-              <p:cNvPr id="194" name="TextBox 193"/>
-              <p:cNvSpPr txBox="1"/>
-              <p:nvPr/>
-            </p:nvSpPr>
-            <p:spPr>
-              <a:xfrm>
-                <a:off x="7106326" y="3089946"/>
-                <a:ext cx="538930" cy="276999"/>
-              </a:xfrm>
-              <a:prstGeom prst="rect">
-                <a:avLst/>
-              </a:prstGeom>
-              <a:noFill/>
-            </p:spPr>
-            <p:txBody>
-              <a:bodyPr wrap="none" rtlCol="0">
-                <a:spAutoFit/>
-              </a:bodyPr>
-              <a:lstStyle/>
-              <a:p>
-                <a:r>
-                  <a:rPr lang="en-US" sz="1200" dirty="0"/>
-                  <a:t>Owns</a:t>
-                </a:r>
-              </a:p>
-            </p:txBody>
-          </p:sp>
-          <p:sp>
-            <p:nvSpPr>
-              <p:cNvPr id="195" name="TextBox 194"/>
-              <p:cNvSpPr txBox="1"/>
-              <p:nvPr/>
-            </p:nvSpPr>
-            <p:spPr>
-              <a:xfrm>
-                <a:off x="7558768" y="2985171"/>
-                <a:ext cx="646395" cy="276999"/>
-              </a:xfrm>
-              <a:prstGeom prst="rect">
-                <a:avLst/>
-              </a:prstGeom>
-              <a:noFill/>
-            </p:spPr>
-            <p:txBody>
-              <a:bodyPr wrap="none" rtlCol="0">
-                <a:spAutoFit/>
-              </a:bodyPr>
-              <a:lstStyle/>
-              <a:p>
-                <a:r>
-                  <a:rPr lang="en-US" sz="1200" dirty="0"/>
-                  <a:t>Evolves</a:t>
-                </a:r>
-              </a:p>
-            </p:txBody>
-          </p:sp>
-          <p:sp>
-            <p:nvSpPr>
-              <p:cNvPr id="196" name="TextBox 195"/>
-              <p:cNvSpPr txBox="1"/>
-              <p:nvPr/>
-            </p:nvSpPr>
-            <p:spPr>
-              <a:xfrm>
-                <a:off x="8139796" y="2866103"/>
-                <a:ext cx="540533" cy="276999"/>
-              </a:xfrm>
-              <a:prstGeom prst="rect">
-                <a:avLst/>
-              </a:prstGeom>
-              <a:noFill/>
-            </p:spPr>
-            <p:txBody>
-              <a:bodyPr wrap="none" rtlCol="0">
-                <a:spAutoFit/>
-              </a:bodyPr>
-              <a:lstStyle/>
-              <a:p>
-                <a:r>
-                  <a:rPr lang="en-US" sz="1200" dirty="0"/>
-                  <a:t>Leads</a:t>
-                </a:r>
-              </a:p>
-            </p:txBody>
-          </p:sp>
-          <p:sp>
-            <p:nvSpPr>
-              <p:cNvPr id="197" name="TextBox 196"/>
-              <p:cNvSpPr txBox="1"/>
-              <p:nvPr/>
-            </p:nvSpPr>
-            <p:spPr>
-              <a:xfrm>
-                <a:off x="8913638" y="2544572"/>
-                <a:ext cx="851452" cy="369332"/>
-              </a:xfrm>
-              <a:prstGeom prst="rect">
-                <a:avLst/>
-              </a:prstGeom>
-              <a:noFill/>
-            </p:spPr>
-            <p:txBody>
-              <a:bodyPr wrap="none" rtlCol="0">
-                <a:spAutoFit/>
-              </a:bodyPr>
-              <a:lstStyle/>
-              <a:p>
-                <a:r>
-                  <a:rPr lang="en-US" dirty="0"/>
-                  <a:t>System</a:t>
-                </a:r>
-              </a:p>
-            </p:txBody>
-          </p:sp>
-          <p:sp>
-            <p:nvSpPr>
-              <p:cNvPr id="198" name="TextBox 197"/>
-              <p:cNvSpPr txBox="1"/>
-              <p:nvPr/>
-            </p:nvSpPr>
-            <p:spPr>
-              <a:xfrm>
-                <a:off x="5165741" y="2994048"/>
-                <a:ext cx="849913" cy="276999"/>
-              </a:xfrm>
-              <a:prstGeom prst="rect">
-                <a:avLst/>
-              </a:prstGeom>
-              <a:noFill/>
-            </p:spPr>
-            <p:txBody>
-              <a:bodyPr wrap="none" rtlCol="0">
-                <a:spAutoFit/>
-              </a:bodyPr>
-              <a:lstStyle/>
-              <a:p>
-                <a:r>
-                  <a:rPr lang="en-US" sz="1200" dirty="0"/>
-                  <a:t>Subsystem</a:t>
-                </a:r>
-              </a:p>
-            </p:txBody>
-          </p:sp>
-          <p:sp>
-            <p:nvSpPr>
-              <p:cNvPr id="199" name="TextBox 198"/>
-              <p:cNvSpPr txBox="1"/>
-              <p:nvPr/>
-            </p:nvSpPr>
-            <p:spPr>
-              <a:xfrm>
-                <a:off x="5018106" y="2803542"/>
-                <a:ext cx="520592" cy="276999"/>
-              </a:xfrm>
-              <a:prstGeom prst="rect">
-                <a:avLst/>
-              </a:prstGeom>
-              <a:noFill/>
-            </p:spPr>
-            <p:txBody>
-              <a:bodyPr wrap="none" rtlCol="0">
-                <a:spAutoFit/>
-              </a:bodyPr>
-              <a:lstStyle/>
-              <a:p>
-                <a:r>
-                  <a:rPr lang="en-US" sz="1200"/>
-                  <a:t>Team</a:t>
-                </a:r>
-                <a:endParaRPr lang="en-US" sz="1200" dirty="0"/>
-              </a:p>
-            </p:txBody>
-          </p:sp>
-          <p:sp>
-            <p:nvSpPr>
-              <p:cNvPr id="200" name="TextBox 199"/>
-              <p:cNvSpPr txBox="1"/>
-              <p:nvPr/>
-            </p:nvSpPr>
-            <p:spPr>
-              <a:xfrm>
-                <a:off x="4498988" y="2598752"/>
-                <a:ext cx="745717" cy="461665"/>
-              </a:xfrm>
-              <a:prstGeom prst="rect">
-                <a:avLst/>
-              </a:prstGeom>
-              <a:noFill/>
-            </p:spPr>
-            <p:txBody>
-              <a:bodyPr wrap="none" rtlCol="0">
-                <a:spAutoFit/>
-              </a:bodyPr>
-              <a:lstStyle/>
-              <a:p>
-                <a:r>
-                  <a:rPr lang="en-US" sz="1200"/>
-                  <a:t>Multiple </a:t>
-                </a:r>
-              </a:p>
-              <a:p>
-                <a:r>
-                  <a:rPr lang="en-US" sz="1200" dirty="0"/>
-                  <a:t>Teams</a:t>
-                </a:r>
-              </a:p>
-            </p:txBody>
-          </p:sp>
-          <p:sp>
-            <p:nvSpPr>
-              <p:cNvPr id="201" name="TextBox 200"/>
-              <p:cNvSpPr txBox="1"/>
-              <p:nvPr/>
-            </p:nvSpPr>
-            <p:spPr>
-              <a:xfrm>
-                <a:off x="3779843" y="2636848"/>
-                <a:ext cx="771814" cy="276999"/>
-              </a:xfrm>
-              <a:prstGeom prst="rect">
-                <a:avLst/>
-              </a:prstGeom>
-              <a:noFill/>
-            </p:spPr>
-            <p:txBody>
-              <a:bodyPr wrap="none" rtlCol="0">
-                <a:spAutoFit/>
-              </a:bodyPr>
-              <a:lstStyle/>
-              <a:p>
-                <a:r>
-                  <a:rPr lang="en-US" sz="1200" dirty="0"/>
-                  <a:t>Company</a:t>
-                </a:r>
-              </a:p>
-            </p:txBody>
-          </p:sp>
-          <p:sp>
-            <p:nvSpPr>
-              <p:cNvPr id="202" name="TextBox 201"/>
-              <p:cNvSpPr txBox="1"/>
-              <p:nvPr/>
-            </p:nvSpPr>
-            <p:spPr>
-              <a:xfrm>
-                <a:off x="3460644" y="2433616"/>
-                <a:ext cx="910827" cy="276999"/>
-              </a:xfrm>
-              <a:prstGeom prst="rect">
-                <a:avLst/>
-              </a:prstGeom>
-              <a:noFill/>
-            </p:spPr>
-            <p:txBody>
-              <a:bodyPr wrap="none" rtlCol="0">
-                <a:spAutoFit/>
-              </a:bodyPr>
-              <a:lstStyle/>
-              <a:p>
-                <a:r>
-                  <a:rPr lang="en-US" sz="1200" dirty="0"/>
-                  <a:t>Community</a:t>
-                </a:r>
-              </a:p>
-            </p:txBody>
-          </p:sp>
-          <p:sp>
-            <p:nvSpPr>
-              <p:cNvPr id="203" name="TextBox 202"/>
-              <p:cNvSpPr txBox="1"/>
-              <p:nvPr/>
-            </p:nvSpPr>
-            <p:spPr>
-              <a:xfrm>
-                <a:off x="2108011" y="2539804"/>
-                <a:ext cx="1058751" cy="369332"/>
-              </a:xfrm>
-              <a:prstGeom prst="rect">
-                <a:avLst/>
-              </a:prstGeom>
-              <a:noFill/>
-            </p:spPr>
-            <p:txBody>
-              <a:bodyPr wrap="none" rtlCol="0">
-                <a:spAutoFit/>
-              </a:bodyPr>
-              <a:lstStyle/>
-              <a:p>
-                <a:r>
-                  <a:rPr lang="en-US" dirty="0"/>
-                  <a:t>Influence</a:t>
-                </a:r>
-              </a:p>
-            </p:txBody>
-          </p:sp>
-          <p:sp>
-            <p:nvSpPr>
-              <p:cNvPr id="204" name="TextBox 203"/>
-              <p:cNvSpPr txBox="1"/>
-              <p:nvPr/>
-            </p:nvSpPr>
-            <p:spPr>
-              <a:xfrm>
-                <a:off x="7416824" y="6166401"/>
-                <a:ext cx="826060" cy="369332"/>
-              </a:xfrm>
-              <a:prstGeom prst="rect">
-                <a:avLst/>
-              </a:prstGeom>
-              <a:noFill/>
-            </p:spPr>
-            <p:txBody>
-              <a:bodyPr wrap="none" rtlCol="0">
-                <a:spAutoFit/>
-              </a:bodyPr>
-              <a:lstStyle/>
-              <a:p>
-                <a:r>
-                  <a:rPr lang="en-US" dirty="0"/>
-                  <a:t>People</a:t>
-                </a:r>
-              </a:p>
-            </p:txBody>
-          </p:sp>
-          <p:sp>
-            <p:nvSpPr>
-              <p:cNvPr id="205" name="TextBox 204"/>
-              <p:cNvSpPr txBox="1"/>
-              <p:nvPr/>
-            </p:nvSpPr>
-            <p:spPr>
-              <a:xfrm>
-                <a:off x="3811595" y="6161638"/>
-                <a:ext cx="894284" cy="369332"/>
-              </a:xfrm>
-              <a:prstGeom prst="rect">
-                <a:avLst/>
-              </a:prstGeom>
-              <a:noFill/>
-            </p:spPr>
-            <p:txBody>
-              <a:bodyPr wrap="none" rtlCol="0">
-                <a:spAutoFit/>
-              </a:bodyPr>
-              <a:lstStyle/>
-              <a:p>
-                <a:r>
-                  <a:rPr lang="en-US" dirty="0"/>
-                  <a:t>Process</a:t>
-                </a:r>
-              </a:p>
-            </p:txBody>
-          </p:sp>
-          <p:sp>
-            <p:nvSpPr>
-              <p:cNvPr id="206" name="TextBox 205"/>
-              <p:cNvSpPr txBox="1"/>
-              <p:nvPr/>
-            </p:nvSpPr>
-            <p:spPr>
-              <a:xfrm>
-                <a:off x="5731357" y="3700439"/>
-                <a:ext cx="593432" cy="276999"/>
-              </a:xfrm>
-              <a:prstGeom prst="rect">
-                <a:avLst/>
-              </a:prstGeom>
-              <a:noFill/>
-            </p:spPr>
-            <p:txBody>
-              <a:bodyPr wrap="none" rtlCol="0">
-                <a:spAutoFit/>
-              </a:bodyPr>
-              <a:lstStyle/>
-              <a:p>
-                <a:r>
-                  <a:rPr lang="en-US" sz="1200" dirty="0"/>
-                  <a:t>Learns</a:t>
-                </a:r>
-              </a:p>
-            </p:txBody>
-          </p:sp>
-          <p:sp>
-            <p:nvSpPr>
-              <p:cNvPr id="207" name="TextBox 206"/>
-              <p:cNvSpPr txBox="1"/>
-              <p:nvPr/>
-            </p:nvSpPr>
-            <p:spPr>
-              <a:xfrm>
-                <a:off x="5869469" y="4167166"/>
-                <a:ext cx="742511" cy="276999"/>
-              </a:xfrm>
-              <a:prstGeom prst="rect">
-                <a:avLst/>
-              </a:prstGeom>
-              <a:noFill/>
-            </p:spPr>
-            <p:txBody>
-              <a:bodyPr wrap="none" rtlCol="0">
-                <a:spAutoFit/>
-              </a:bodyPr>
-              <a:lstStyle/>
-              <a:p>
-                <a:r>
-                  <a:rPr lang="en-US" sz="1200"/>
-                  <a:t>Supports</a:t>
-                </a:r>
-                <a:endParaRPr lang="en-US" sz="1200" dirty="0"/>
-              </a:p>
-            </p:txBody>
-          </p:sp>
-          <p:sp>
-            <p:nvSpPr>
-              <p:cNvPr id="208" name="TextBox 207"/>
-              <p:cNvSpPr txBox="1"/>
-              <p:nvPr/>
-            </p:nvSpPr>
-            <p:spPr>
-              <a:xfrm>
-                <a:off x="6221886" y="4605321"/>
-                <a:ext cx="714619" cy="276999"/>
-              </a:xfrm>
-              <a:prstGeom prst="rect">
-                <a:avLst/>
-              </a:prstGeom>
-              <a:noFill/>
-            </p:spPr>
-            <p:txBody>
-              <a:bodyPr wrap="none" rtlCol="0">
-                <a:spAutoFit/>
-              </a:bodyPr>
-              <a:lstStyle/>
-              <a:p>
-                <a:r>
-                  <a:rPr lang="en-US" sz="1200"/>
-                  <a:t>Mentors</a:t>
-                </a:r>
-                <a:endParaRPr lang="en-US" sz="1200" dirty="0"/>
-              </a:p>
-            </p:txBody>
-          </p:sp>
-          <p:sp>
-            <p:nvSpPr>
-              <p:cNvPr id="209" name="TextBox 208"/>
-              <p:cNvSpPr txBox="1"/>
-              <p:nvPr/>
-            </p:nvSpPr>
-            <p:spPr>
-              <a:xfrm>
-                <a:off x="6231406" y="5057759"/>
-                <a:ext cx="936347" cy="276999"/>
-              </a:xfrm>
-              <a:prstGeom prst="rect">
-                <a:avLst/>
-              </a:prstGeom>
-              <a:noFill/>
-            </p:spPr>
-            <p:txBody>
-              <a:bodyPr wrap="none" rtlCol="0">
-                <a:spAutoFit/>
-              </a:bodyPr>
-              <a:lstStyle/>
-              <a:p>
-                <a:r>
-                  <a:rPr lang="en-US" sz="1200"/>
-                  <a:t>Coordinates</a:t>
-                </a:r>
-                <a:endParaRPr lang="en-US" sz="1200" dirty="0"/>
-              </a:p>
-            </p:txBody>
-          </p:sp>
-          <p:sp>
-            <p:nvSpPr>
-              <p:cNvPr id="210" name="TextBox 209"/>
-              <p:cNvSpPr txBox="1"/>
-              <p:nvPr/>
-            </p:nvSpPr>
-            <p:spPr>
-              <a:xfrm>
-                <a:off x="6755282" y="5538771"/>
-                <a:ext cx="752514" cy="276999"/>
-              </a:xfrm>
-              <a:prstGeom prst="rect">
-                <a:avLst/>
-              </a:prstGeom>
-              <a:noFill/>
-            </p:spPr>
-            <p:txBody>
-              <a:bodyPr wrap="none" rtlCol="0">
-                <a:spAutoFit/>
-              </a:bodyPr>
-              <a:lstStyle/>
-              <a:p>
-                <a:r>
-                  <a:rPr lang="en-US" sz="1200" dirty="0"/>
-                  <a:t>Manages</a:t>
-                </a:r>
-              </a:p>
-            </p:txBody>
-          </p:sp>
-          <p:sp>
-            <p:nvSpPr>
-              <p:cNvPr id="211" name="TextBox 210"/>
-              <p:cNvSpPr txBox="1"/>
-              <p:nvPr/>
-            </p:nvSpPr>
-            <p:spPr>
-              <a:xfrm>
-                <a:off x="5093248" y="3692361"/>
-                <a:ext cx="657103" cy="276999"/>
-              </a:xfrm>
-              <a:prstGeom prst="rect">
-                <a:avLst/>
-              </a:prstGeom>
-              <a:noFill/>
-            </p:spPr>
-            <p:txBody>
-              <a:bodyPr wrap="none" rtlCol="0">
-                <a:spAutoFit/>
-              </a:bodyPr>
-              <a:lstStyle/>
-              <a:p>
-                <a:r>
-                  <a:rPr lang="en-US" sz="1200" dirty="0"/>
-                  <a:t>Follows</a:t>
-                </a:r>
-                <a:endParaRPr lang="en-US" sz="1100" dirty="0"/>
-              </a:p>
-            </p:txBody>
-          </p:sp>
-          <p:sp>
-            <p:nvSpPr>
-              <p:cNvPr id="212" name="TextBox 211"/>
-              <p:cNvSpPr txBox="1"/>
-              <p:nvPr/>
-            </p:nvSpPr>
-            <p:spPr>
-              <a:xfrm>
-                <a:off x="4717010" y="4144803"/>
-                <a:ext cx="718851" cy="276999"/>
-              </a:xfrm>
-              <a:prstGeom prst="rect">
-                <a:avLst/>
-              </a:prstGeom>
-              <a:noFill/>
-            </p:spPr>
-            <p:txBody>
-              <a:bodyPr wrap="none" rtlCol="0">
-                <a:spAutoFit/>
-              </a:bodyPr>
-              <a:lstStyle/>
-              <a:p>
-                <a:r>
-                  <a:rPr lang="en-US" sz="1200" dirty="0"/>
-                  <a:t>Enforces</a:t>
-                </a:r>
-              </a:p>
-            </p:txBody>
-          </p:sp>
-          <p:sp>
-            <p:nvSpPr>
-              <p:cNvPr id="213" name="TextBox 212"/>
-              <p:cNvSpPr txBox="1"/>
-              <p:nvPr/>
-            </p:nvSpPr>
-            <p:spPr>
-              <a:xfrm>
-                <a:off x="4269331" y="4582958"/>
-                <a:ext cx="856709" cy="276999"/>
-              </a:xfrm>
-              <a:prstGeom prst="rect">
-                <a:avLst/>
-              </a:prstGeom>
-              <a:noFill/>
-            </p:spPr>
-            <p:txBody>
-              <a:bodyPr wrap="none" rtlCol="0">
-                <a:spAutoFit/>
-              </a:bodyPr>
-              <a:lstStyle/>
-              <a:p>
-                <a:r>
-                  <a:rPr lang="en-US" sz="1200" dirty="0"/>
-                  <a:t>Challenges</a:t>
-                </a:r>
-              </a:p>
-            </p:txBody>
-          </p:sp>
-          <p:sp>
-            <p:nvSpPr>
-              <p:cNvPr id="214" name="TextBox 213"/>
-              <p:cNvSpPr txBox="1"/>
-              <p:nvPr/>
-            </p:nvSpPr>
-            <p:spPr>
-              <a:xfrm>
-                <a:off x="4221713" y="5049688"/>
-                <a:ext cx="643061" cy="276999"/>
-              </a:xfrm>
-              <a:prstGeom prst="rect">
-                <a:avLst/>
-              </a:prstGeom>
-              <a:noFill/>
-            </p:spPr>
-            <p:txBody>
-              <a:bodyPr wrap="none" rtlCol="0">
-                <a:spAutoFit/>
-              </a:bodyPr>
-              <a:lstStyle/>
-              <a:p>
-                <a:r>
-                  <a:rPr lang="en-US" sz="1200" dirty="0"/>
-                  <a:t>Adjusts</a:t>
-                </a:r>
-              </a:p>
-            </p:txBody>
-          </p:sp>
-          <p:sp>
-            <p:nvSpPr>
-              <p:cNvPr id="215" name="TextBox 214"/>
-              <p:cNvSpPr txBox="1"/>
-              <p:nvPr/>
-            </p:nvSpPr>
-            <p:spPr>
-              <a:xfrm>
-                <a:off x="4102658" y="5373536"/>
-                <a:ext cx="484428" cy="461665"/>
-              </a:xfrm>
-              <a:prstGeom prst="rect">
-                <a:avLst/>
-              </a:prstGeom>
-              <a:noFill/>
-            </p:spPr>
-            <p:txBody>
-              <a:bodyPr wrap="none" rtlCol="0">
-                <a:spAutoFit/>
-              </a:bodyPr>
-              <a:lstStyle/>
-              <a:p>
-                <a:r>
-                  <a:rPr lang="en-US" sz="1200" dirty="0"/>
-                  <a:t>De-</a:t>
-                </a:r>
-              </a:p>
-              <a:p>
-                <a:r>
-                  <a:rPr lang="en-US" sz="1200" dirty="0"/>
-                  <a:t>fines</a:t>
-                </a:r>
-              </a:p>
-            </p:txBody>
-          </p:sp>
-        </p:grpSp>
+            <a:prstGeom prst="rect">
+              <a:avLst/>
+            </a:prstGeom>
+            <a:noFill/>
+          </p:spPr>
+          <p:txBody>
+            <a:bodyPr wrap="none" rtlCol="0">
+              <a:spAutoFit/>
+            </a:bodyPr>
+            <a:lstStyle/>
+            <a:p>
+              <a:r>
+                <a:rPr lang="en-US" dirty="0" err="1"/>
+                <a:t>Processo</a:t>
+              </a:r>
+              <a:endParaRPr lang="en-US" dirty="0"/>
+            </a:p>
+          </p:txBody>
+        </p:sp>
+        <p:sp>
+          <p:nvSpPr>
+            <p:cNvPr id="78" name="TextBox 77"/>
+            <p:cNvSpPr txBox="1"/>
+            <p:nvPr/>
+          </p:nvSpPr>
+          <p:spPr>
+            <a:xfrm>
+              <a:off x="5725106" y="3778238"/>
+              <a:ext cx="719621" cy="276999"/>
+            </a:xfrm>
+            <a:prstGeom prst="rect">
+              <a:avLst/>
+            </a:prstGeom>
+            <a:noFill/>
+          </p:spPr>
+          <p:txBody>
+            <a:bodyPr wrap="none" rtlCol="0">
+              <a:spAutoFit/>
+            </a:bodyPr>
+            <a:lstStyle/>
+            <a:p>
+              <a:r>
+                <a:rPr lang="en-US" sz="1200" dirty="0" err="1"/>
+                <a:t>Aprende</a:t>
+              </a:r>
+              <a:endParaRPr lang="en-US" sz="1200" dirty="0"/>
+            </a:p>
+          </p:txBody>
+        </p:sp>
+        <p:sp>
+          <p:nvSpPr>
+            <p:cNvPr id="79" name="TextBox 78"/>
+            <p:cNvSpPr txBox="1"/>
+            <p:nvPr/>
+          </p:nvSpPr>
+          <p:spPr>
+            <a:xfrm>
+              <a:off x="6076547" y="4262210"/>
+              <a:ext cx="673326" cy="276999"/>
+            </a:xfrm>
+            <a:prstGeom prst="rect">
+              <a:avLst/>
+            </a:prstGeom>
+            <a:noFill/>
+          </p:spPr>
+          <p:txBody>
+            <a:bodyPr wrap="none" rtlCol="0">
+              <a:spAutoFit/>
+            </a:bodyPr>
+            <a:lstStyle/>
+            <a:p>
+              <a:r>
+                <a:rPr lang="en-US" sz="1200" dirty="0" err="1"/>
+                <a:t>Suporta</a:t>
+              </a:r>
+              <a:endParaRPr lang="en-US" sz="1200" dirty="0"/>
+            </a:p>
+          </p:txBody>
+        </p:sp>
+        <p:sp>
+          <p:nvSpPr>
+            <p:cNvPr id="80" name="TextBox 79"/>
+            <p:cNvSpPr txBox="1"/>
+            <p:nvPr/>
+          </p:nvSpPr>
+          <p:spPr>
+            <a:xfrm>
+              <a:off x="6325443" y="4691461"/>
+              <a:ext cx="726866" cy="276999"/>
+            </a:xfrm>
+            <a:prstGeom prst="rect">
+              <a:avLst/>
+            </a:prstGeom>
+            <a:noFill/>
+          </p:spPr>
+          <p:txBody>
+            <a:bodyPr wrap="none" rtlCol="0">
+              <a:spAutoFit/>
+            </a:bodyPr>
+            <a:lstStyle/>
+            <a:p>
+              <a:r>
+                <a:rPr lang="en-US" sz="1200" dirty="0" err="1"/>
+                <a:t>Mentora</a:t>
+              </a:r>
+              <a:endParaRPr lang="en-US" sz="1200" dirty="0"/>
+            </a:p>
+          </p:txBody>
+        </p:sp>
+        <p:sp>
+          <p:nvSpPr>
+            <p:cNvPr id="81" name="TextBox 80"/>
+            <p:cNvSpPr txBox="1"/>
+            <p:nvPr/>
+          </p:nvSpPr>
+          <p:spPr>
+            <a:xfrm>
+              <a:off x="6539273" y="5126626"/>
+              <a:ext cx="791692" cy="276999"/>
+            </a:xfrm>
+            <a:prstGeom prst="rect">
+              <a:avLst/>
+            </a:prstGeom>
+            <a:noFill/>
+          </p:spPr>
+          <p:txBody>
+            <a:bodyPr wrap="none" rtlCol="0">
+              <a:spAutoFit/>
+            </a:bodyPr>
+            <a:lstStyle/>
+            <a:p>
+              <a:r>
+                <a:rPr lang="en-US" sz="1200" dirty="0" err="1"/>
+                <a:t>Coordena</a:t>
+              </a:r>
+              <a:endParaRPr lang="en-US" sz="1200" dirty="0"/>
+            </a:p>
+          </p:txBody>
+        </p:sp>
+        <p:sp>
+          <p:nvSpPr>
+            <p:cNvPr id="82" name="TextBox 81"/>
+            <p:cNvSpPr txBox="1"/>
+            <p:nvPr/>
+          </p:nvSpPr>
+          <p:spPr>
+            <a:xfrm>
+              <a:off x="6914730" y="5628009"/>
+              <a:ext cx="742063" cy="276999"/>
+            </a:xfrm>
+            <a:prstGeom prst="rect">
+              <a:avLst/>
+            </a:prstGeom>
+            <a:noFill/>
+          </p:spPr>
+          <p:txBody>
+            <a:bodyPr wrap="none" rtlCol="0">
+              <a:spAutoFit/>
+            </a:bodyPr>
+            <a:lstStyle/>
+            <a:p>
+              <a:r>
+                <a:rPr lang="en-US" sz="1200" dirty="0" err="1"/>
+                <a:t>Gerencia</a:t>
+              </a:r>
+              <a:endParaRPr lang="en-US" sz="1200" dirty="0"/>
+            </a:p>
+          </p:txBody>
+        </p:sp>
+        <p:sp>
+          <p:nvSpPr>
+            <p:cNvPr id="83" name="TextBox 82"/>
+            <p:cNvSpPr txBox="1"/>
+            <p:nvPr/>
+          </p:nvSpPr>
+          <p:spPr>
+            <a:xfrm rot="4210315">
+              <a:off x="5334951" y="3556638"/>
+              <a:ext cx="561372" cy="276999"/>
+            </a:xfrm>
+            <a:prstGeom prst="rect">
+              <a:avLst/>
+            </a:prstGeom>
+            <a:noFill/>
+          </p:spPr>
+          <p:txBody>
+            <a:bodyPr wrap="none" rtlCol="0">
+              <a:spAutoFit/>
+            </a:bodyPr>
+            <a:lstStyle/>
+            <a:p>
+              <a:r>
+                <a:rPr lang="en-US" sz="1200" dirty="0"/>
+                <a:t>Segue</a:t>
+              </a:r>
+              <a:endParaRPr lang="en-US" sz="1100" dirty="0"/>
+            </a:p>
+          </p:txBody>
+        </p:sp>
+        <p:sp>
+          <p:nvSpPr>
+            <p:cNvPr id="84" name="TextBox 83"/>
+            <p:cNvSpPr txBox="1"/>
+            <p:nvPr/>
+          </p:nvSpPr>
+          <p:spPr>
+            <a:xfrm rot="4293150">
+              <a:off x="5036454" y="4014031"/>
+              <a:ext cx="563296" cy="276999"/>
+            </a:xfrm>
+            <a:prstGeom prst="rect">
+              <a:avLst/>
+            </a:prstGeom>
+            <a:noFill/>
+          </p:spPr>
+          <p:txBody>
+            <a:bodyPr wrap="none" rtlCol="0">
+              <a:spAutoFit/>
+            </a:bodyPr>
+            <a:lstStyle/>
+            <a:p>
+              <a:r>
+                <a:rPr lang="en-US" sz="1200" dirty="0" err="1"/>
+                <a:t>Aplica</a:t>
+              </a:r>
+              <a:endParaRPr lang="en-US" sz="1200" dirty="0"/>
+            </a:p>
+          </p:txBody>
+        </p:sp>
+        <p:sp>
+          <p:nvSpPr>
+            <p:cNvPr id="85" name="TextBox 84"/>
+            <p:cNvSpPr txBox="1"/>
+            <p:nvPr/>
+          </p:nvSpPr>
+          <p:spPr>
+            <a:xfrm rot="4124180">
+              <a:off x="4689041" y="4427251"/>
+              <a:ext cx="645433" cy="276999"/>
+            </a:xfrm>
+            <a:prstGeom prst="rect">
+              <a:avLst/>
+            </a:prstGeom>
+            <a:noFill/>
+          </p:spPr>
+          <p:txBody>
+            <a:bodyPr wrap="none" rtlCol="0">
+              <a:spAutoFit/>
+            </a:bodyPr>
+            <a:lstStyle/>
+            <a:p>
+              <a:r>
+                <a:rPr lang="en-US" sz="1200" dirty="0" err="1"/>
+                <a:t>Desafia</a:t>
+              </a:r>
+              <a:endParaRPr lang="en-US" sz="1200" dirty="0"/>
+            </a:p>
+          </p:txBody>
+        </p:sp>
+        <p:sp>
+          <p:nvSpPr>
+            <p:cNvPr id="86" name="TextBox 85"/>
+            <p:cNvSpPr txBox="1"/>
+            <p:nvPr/>
+          </p:nvSpPr>
+          <p:spPr>
+            <a:xfrm rot="4328861">
+              <a:off x="4427961" y="4921645"/>
+              <a:ext cx="573811" cy="276999"/>
+            </a:xfrm>
+            <a:prstGeom prst="rect">
+              <a:avLst/>
+            </a:prstGeom>
+            <a:noFill/>
+          </p:spPr>
+          <p:txBody>
+            <a:bodyPr wrap="none" rtlCol="0">
+              <a:spAutoFit/>
+            </a:bodyPr>
+            <a:lstStyle/>
+            <a:p>
+              <a:r>
+                <a:rPr lang="en-US" sz="1200" dirty="0" err="1"/>
+                <a:t>Ajusta</a:t>
+              </a:r>
+              <a:endParaRPr lang="en-US" sz="1200" dirty="0"/>
+            </a:p>
+          </p:txBody>
+        </p:sp>
+        <p:sp>
+          <p:nvSpPr>
+            <p:cNvPr id="87" name="TextBox 86"/>
+            <p:cNvSpPr txBox="1"/>
+            <p:nvPr/>
+          </p:nvSpPr>
+          <p:spPr>
+            <a:xfrm rot="4334450">
+              <a:off x="4107613" y="5414777"/>
+              <a:ext cx="593689" cy="276999"/>
+            </a:xfrm>
+            <a:prstGeom prst="rect">
+              <a:avLst/>
+            </a:prstGeom>
+            <a:noFill/>
+          </p:spPr>
+          <p:txBody>
+            <a:bodyPr wrap="none" rtlCol="0">
+              <a:spAutoFit/>
+            </a:bodyPr>
+            <a:lstStyle/>
+            <a:p>
+              <a:r>
+                <a:rPr lang="en-US" sz="1200" dirty="0"/>
+                <a:t>Define</a:t>
+              </a:r>
+            </a:p>
+          </p:txBody>
+        </p:sp>
       </p:grpSp>
+      <p:sp>
+        <p:nvSpPr>
+          <p:cNvPr id="2" name="Rectangle 92">
+            <a:extLst>
+              <a:ext uri="{FF2B5EF4-FFF2-40B4-BE49-F238E27FC236}">
+                <a16:creationId xmlns:a16="http://schemas.microsoft.com/office/drawing/2014/main" id="{E4AE8F23-324B-6B22-4B5E-8BB4A2143158}"/>
+              </a:ext>
+            </a:extLst>
+          </p:cNvPr>
+          <p:cNvSpPr/>
+          <p:nvPr/>
+        </p:nvSpPr>
+        <p:spPr>
+          <a:xfrm>
+            <a:off x="2161082" y="279824"/>
+            <a:ext cx="564578" cy="369332"/>
+          </a:xfrm>
+          <a:prstGeom prst="rect">
+            <a:avLst/>
+          </a:prstGeom>
+          <a:ln>
+            <a:solidFill>
+              <a:schemeClr val="tx1"/>
+            </a:solidFill>
+          </a:ln>
+        </p:spPr>
+        <p:txBody>
+          <a:bodyPr wrap="none">
+            <a:spAutoFit/>
+          </a:bodyPr>
+          <a:lstStyle/>
+          <a:p>
+            <a:r>
+              <a:rPr lang="en-US" b="1" dirty="0">
+                <a:effectLst/>
+                <a:latin typeface="Calibri" charset="0"/>
+                <a:ea typeface="Calibri" charset="0"/>
+                <a:cs typeface="Times New Roman" charset="0"/>
+              </a:rPr>
+              <a:t>D13</a:t>
+            </a:r>
+            <a:endParaRPr lang="en-US" dirty="0"/>
+          </a:p>
+        </p:txBody>
+      </p:sp>
+      <p:cxnSp>
+        <p:nvCxnSpPr>
+          <p:cNvPr id="3" name="Straight Connector 88">
+            <a:extLst>
+              <a:ext uri="{FF2B5EF4-FFF2-40B4-BE49-F238E27FC236}">
+                <a16:creationId xmlns:a16="http://schemas.microsoft.com/office/drawing/2014/main" id="{47AF490A-1D82-4A42-D937-F0B4C180006A}"/>
+              </a:ext>
+            </a:extLst>
+          </p:cNvPr>
+          <p:cNvCxnSpPr>
+            <a:cxnSpLocks/>
+          </p:cNvCxnSpPr>
+          <p:nvPr/>
+        </p:nvCxnSpPr>
+        <p:spPr>
+          <a:xfrm flipH="1" flipV="1">
+            <a:off x="5566762" y="3278213"/>
+            <a:ext cx="158344" cy="563316"/>
+          </a:xfrm>
+          <a:prstGeom prst="line">
+            <a:avLst/>
+          </a:prstGeom>
+          <a:ln w="25400">
+            <a:solidFill>
+              <a:srgbClr val="00B0F0"/>
+            </a:solidFill>
+          </a:ln>
+        </p:spPr>
+        <p:style>
+          <a:lnRef idx="1">
+            <a:schemeClr val="accent1"/>
+          </a:lnRef>
+          <a:fillRef idx="0">
+            <a:schemeClr val="accent1"/>
+          </a:fillRef>
+          <a:effectRef idx="0">
+            <a:schemeClr val="accent1"/>
+          </a:effectRef>
+          <a:fontRef idx="minor">
+            <a:schemeClr val="tx1"/>
+          </a:fontRef>
+        </p:style>
+      </p:cxnSp>
+      <p:cxnSp>
+        <p:nvCxnSpPr>
+          <p:cNvPr id="6" name="Straight Connector 88">
+            <a:extLst>
+              <a:ext uri="{FF2B5EF4-FFF2-40B4-BE49-F238E27FC236}">
+                <a16:creationId xmlns:a16="http://schemas.microsoft.com/office/drawing/2014/main" id="{804D51E5-E0C9-0587-37A7-9E2ECAE969AB}"/>
+              </a:ext>
+            </a:extLst>
+          </p:cNvPr>
+          <p:cNvCxnSpPr>
+            <a:cxnSpLocks/>
+          </p:cNvCxnSpPr>
+          <p:nvPr/>
+        </p:nvCxnSpPr>
+        <p:spPr>
+          <a:xfrm flipH="1">
+            <a:off x="5745686" y="3848801"/>
+            <a:ext cx="579757" cy="3294"/>
+          </a:xfrm>
+          <a:prstGeom prst="line">
+            <a:avLst/>
+          </a:prstGeom>
+          <a:ln w="25400">
+            <a:solidFill>
+              <a:srgbClr val="00B0F0"/>
+            </a:solidFill>
+          </a:ln>
+        </p:spPr>
+        <p:style>
+          <a:lnRef idx="1">
+            <a:schemeClr val="accent1"/>
+          </a:lnRef>
+          <a:fillRef idx="0">
+            <a:schemeClr val="accent1"/>
+          </a:fillRef>
+          <a:effectRef idx="0">
+            <a:schemeClr val="accent1"/>
+          </a:effectRef>
+          <a:fontRef idx="minor">
+            <a:schemeClr val="tx1"/>
+          </a:fontRef>
+        </p:style>
+      </p:cxnSp>
+      <p:cxnSp>
+        <p:nvCxnSpPr>
+          <p:cNvPr id="8" name="Straight Connector 88">
+            <a:extLst>
+              <a:ext uri="{FF2B5EF4-FFF2-40B4-BE49-F238E27FC236}">
+                <a16:creationId xmlns:a16="http://schemas.microsoft.com/office/drawing/2014/main" id="{21ED533C-60F7-2EC5-0B67-F59E763E65A4}"/>
+              </a:ext>
+            </a:extLst>
+          </p:cNvPr>
+          <p:cNvCxnSpPr>
+            <a:cxnSpLocks/>
+          </p:cNvCxnSpPr>
+          <p:nvPr/>
+        </p:nvCxnSpPr>
+        <p:spPr>
+          <a:xfrm flipH="1">
+            <a:off x="6347337" y="3278038"/>
+            <a:ext cx="182859" cy="563491"/>
+          </a:xfrm>
+          <a:prstGeom prst="line">
+            <a:avLst/>
+          </a:prstGeom>
+          <a:ln w="25400">
+            <a:solidFill>
+              <a:srgbClr val="00B0F0"/>
+            </a:solidFill>
+          </a:ln>
+        </p:spPr>
+        <p:style>
+          <a:lnRef idx="1">
+            <a:schemeClr val="accent1"/>
+          </a:lnRef>
+          <a:fillRef idx="0">
+            <a:schemeClr val="accent1"/>
+          </a:fillRef>
+          <a:effectRef idx="0">
+            <a:schemeClr val="accent1"/>
+          </a:effectRef>
+          <a:fontRef idx="minor">
+            <a:schemeClr val="tx1"/>
+          </a:fontRef>
+        </p:style>
+      </p:cxnSp>
+      <p:cxnSp>
+        <p:nvCxnSpPr>
+          <p:cNvPr id="10" name="Straight Connector 88">
+            <a:extLst>
+              <a:ext uri="{FF2B5EF4-FFF2-40B4-BE49-F238E27FC236}">
+                <a16:creationId xmlns:a16="http://schemas.microsoft.com/office/drawing/2014/main" id="{EF664F88-0262-0A0F-D864-CF48DF26C335}"/>
+              </a:ext>
+            </a:extLst>
+          </p:cNvPr>
+          <p:cNvCxnSpPr>
+            <a:cxnSpLocks/>
+          </p:cNvCxnSpPr>
+          <p:nvPr/>
+        </p:nvCxnSpPr>
+        <p:spPr>
+          <a:xfrm>
+            <a:off x="6055743" y="2932981"/>
+            <a:ext cx="486975" cy="333364"/>
+          </a:xfrm>
+          <a:prstGeom prst="line">
+            <a:avLst/>
+          </a:prstGeom>
+          <a:ln w="25400">
+            <a:solidFill>
+              <a:srgbClr val="00B0F0"/>
+            </a:solidFill>
+          </a:ln>
+        </p:spPr>
+        <p:style>
+          <a:lnRef idx="1">
+            <a:schemeClr val="accent1"/>
+          </a:lnRef>
+          <a:fillRef idx="0">
+            <a:schemeClr val="accent1"/>
+          </a:fillRef>
+          <a:effectRef idx="0">
+            <a:schemeClr val="accent1"/>
+          </a:effectRef>
+          <a:fontRef idx="minor">
+            <a:schemeClr val="tx1"/>
+          </a:fontRef>
+        </p:style>
+      </p:cxnSp>
+      <p:cxnSp>
+        <p:nvCxnSpPr>
+          <p:cNvPr id="16" name="Straight Connector 88">
+            <a:extLst>
+              <a:ext uri="{FF2B5EF4-FFF2-40B4-BE49-F238E27FC236}">
+                <a16:creationId xmlns:a16="http://schemas.microsoft.com/office/drawing/2014/main" id="{36748F3A-6B07-7E0D-8EB2-47386EAAA7E0}"/>
+              </a:ext>
+            </a:extLst>
+          </p:cNvPr>
+          <p:cNvCxnSpPr>
+            <a:cxnSpLocks/>
+          </p:cNvCxnSpPr>
+          <p:nvPr/>
+        </p:nvCxnSpPr>
+        <p:spPr>
+          <a:xfrm flipV="1">
+            <a:off x="5581291" y="2950234"/>
+            <a:ext cx="448573" cy="319177"/>
+          </a:xfrm>
+          <a:prstGeom prst="line">
+            <a:avLst/>
+          </a:prstGeom>
+          <a:ln w="25400">
+            <a:solidFill>
+              <a:srgbClr val="00B0F0"/>
+            </a:solidFill>
+          </a:ln>
+        </p:spPr>
+        <p:style>
+          <a:lnRef idx="1">
+            <a:schemeClr val="accent1"/>
+          </a:lnRef>
+          <a:fillRef idx="0">
+            <a:schemeClr val="accent1"/>
+          </a:fillRef>
+          <a:effectRef idx="0">
+            <a:schemeClr val="accent1"/>
+          </a:effectRef>
+          <a:fontRef idx="minor">
+            <a:schemeClr val="tx1"/>
+          </a:fontRef>
+        </p:style>
+      </p:cxnSp>
     </p:spTree>
     <p:extLst>
       <p:ext uri="{BB962C8B-B14F-4D97-AF65-F5344CB8AC3E}">
-        <p14:creationId xmlns:p14="http://schemas.microsoft.com/office/powerpoint/2010/main" val="1741612250"/>
+        <p14:creationId xmlns:p14="http://schemas.microsoft.com/office/powerpoint/2010/main" val="2154407044"/>
       </p:ext>
     </p:extLst>
   </p:cSld>
@@ -25373,6 +25413,7 @@
                 <p:nvCxnSpPr>
                   <p:cNvPr id="272" name="Straight Connector 271"/>
                   <p:cNvCxnSpPr>
+                    <a:cxnSpLocks/>
                     <a:endCxn id="257" idx="1"/>
                   </p:cNvCxnSpPr>
                   <p:nvPr/>
@@ -30031,14 +30072,15 @@
             <p:nvCxnSpPr>
               <p:cNvPr id="93" name="Straight Connector 92"/>
               <p:cNvCxnSpPr>
-                <a:endCxn id="52" idx="1"/>
+                <a:cxnSpLocks/>
+                <a:endCxn id="183" idx="1"/>
               </p:cNvCxnSpPr>
               <p:nvPr/>
             </p:nvCxnSpPr>
             <p:spPr>
               <a:xfrm flipH="1">
                 <a:off x="5078453" y="1571527"/>
-                <a:ext cx="954068" cy="1613044"/>
+                <a:ext cx="954068" cy="1627332"/>
               </a:xfrm>
               <a:prstGeom prst="line">
                 <a:avLst/>

</xml_diff>